<commit_message>
updates to expression/DE lectures
</commit_message>
<xml_diff>
--- a/assets/lectures/cshl/2023/full/RNASeq_Module3_AbundanceEstimation_DifferentialExpression.pptx
+++ b/assets/lectures/cshl/2023/full/RNASeq_Module3_AbundanceEstimation_DifferentialExpression.pptx
@@ -5,32 +5,34 @@
     <p:sldMasterId id="2147483688" r:id="rId1"/>
   </p:sldMasterIdLst>
   <p:notesMasterIdLst>
-    <p:notesMasterId r:id="rId25"/>
+    <p:notesMasterId r:id="rId27"/>
   </p:notesMasterIdLst>
   <p:sldIdLst>
     <p:sldId id="517" r:id="rId2"/>
-    <p:sldId id="518" r:id="rId3"/>
-    <p:sldId id="519" r:id="rId4"/>
-    <p:sldId id="525" r:id="rId5"/>
-    <p:sldId id="526" r:id="rId6"/>
-    <p:sldId id="527" r:id="rId7"/>
-    <p:sldId id="520" r:id="rId8"/>
-    <p:sldId id="521" r:id="rId9"/>
-    <p:sldId id="522" r:id="rId10"/>
-    <p:sldId id="528" r:id="rId11"/>
-    <p:sldId id="529" r:id="rId12"/>
-    <p:sldId id="530" r:id="rId13"/>
-    <p:sldId id="524" r:id="rId14"/>
-    <p:sldId id="536" r:id="rId15"/>
-    <p:sldId id="537" r:id="rId16"/>
-    <p:sldId id="538" r:id="rId17"/>
-    <p:sldId id="539" r:id="rId18"/>
-    <p:sldId id="540" r:id="rId19"/>
-    <p:sldId id="531" r:id="rId20"/>
-    <p:sldId id="532" r:id="rId21"/>
-    <p:sldId id="533" r:id="rId22"/>
-    <p:sldId id="535" r:id="rId23"/>
-    <p:sldId id="541" r:id="rId24"/>
+    <p:sldId id="542" r:id="rId3"/>
+    <p:sldId id="518" r:id="rId4"/>
+    <p:sldId id="519" r:id="rId5"/>
+    <p:sldId id="525" r:id="rId6"/>
+    <p:sldId id="526" r:id="rId7"/>
+    <p:sldId id="527" r:id="rId8"/>
+    <p:sldId id="520" r:id="rId9"/>
+    <p:sldId id="521" r:id="rId10"/>
+    <p:sldId id="544" r:id="rId11"/>
+    <p:sldId id="522" r:id="rId12"/>
+    <p:sldId id="528" r:id="rId13"/>
+    <p:sldId id="529" r:id="rId14"/>
+    <p:sldId id="530" r:id="rId15"/>
+    <p:sldId id="524" r:id="rId16"/>
+    <p:sldId id="536" r:id="rId17"/>
+    <p:sldId id="537" r:id="rId18"/>
+    <p:sldId id="538" r:id="rId19"/>
+    <p:sldId id="539" r:id="rId20"/>
+    <p:sldId id="540" r:id="rId21"/>
+    <p:sldId id="531" r:id="rId22"/>
+    <p:sldId id="532" r:id="rId23"/>
+    <p:sldId id="533" r:id="rId24"/>
+    <p:sldId id="535" r:id="rId25"/>
+    <p:sldId id="541" r:id="rId26"/>
   </p:sldIdLst>
   <p:sldSz cx="12192000" cy="6858000"/>
   <p:notesSz cx="6858000" cy="9144000"/>
@@ -219,7 +221,7 @@
           <a:p>
             <a:fld id="{827BD9F9-8452-A342-BB1B-28ECF19E2CC5}" type="datetimeFigureOut">
               <a:rPr lang="en-US" smtClean="0"/>
-              <a:t>11/13/23</a:t>
+              <a:t>11/15/23</a:t>
             </a:fld>
             <a:endParaRPr lang="en-US"/>
           </a:p>
@@ -557,7 +559,7 @@
               <a:pPr>
                 <a:defRPr/>
               </a:pPr>
-              <a:t>3</a:t>
+              <a:t>2</a:t>
             </a:fld>
             <a:endParaRPr lang="en-US"/>
           </a:p>
@@ -566,7 +568,7 @@
     </p:spTree>
     <p:extLst>
       <p:ext uri="{BB962C8B-B14F-4D97-AF65-F5344CB8AC3E}">
-        <p14:creationId xmlns:p14="http://schemas.microsoft.com/office/powerpoint/2010/main" val="1190592263"/>
+        <p14:creationId xmlns:p14="http://schemas.microsoft.com/office/powerpoint/2010/main" val="698171879"/>
       </p:ext>
     </p:extLst>
   </p:cSld>
@@ -620,14 +622,6 @@
           <a:bodyPr/>
           <a:lstStyle/>
           <a:p>
-            <a:r>
-              <a:rPr lang="en-US" dirty="0"/>
-              <a:t>We recommend </a:t>
-            </a:r>
-            <a:r>
-              <a:rPr lang="en-US" dirty="0" err="1"/>
-              <a:t>intersection_strict</a:t>
-            </a:r>
             <a:endParaRPr lang="en-US" dirty="0"/>
           </a:p>
         </p:txBody>
@@ -639,7 +633,7 @@
             <a:spLocks noGrp="1"/>
           </p:cNvSpPr>
           <p:nvPr>
-            <p:ph type="sldNum" sz="quarter" idx="10"/>
+            <p:ph type="sldNum" sz="quarter" idx="5"/>
           </p:nvPr>
         </p:nvSpPr>
         <p:spPr/>
@@ -647,14 +641,8 @@
           <a:bodyPr/>
           <a:lstStyle/>
           <a:p>
-            <a:pPr>
-              <a:defRPr/>
-            </a:pPr>
-            <a:fld id="{F3969550-FBCF-404B-9FAA-7B1DCDF2C4FF}" type="slidenum">
+            <a:fld id="{91C65747-E6F5-D94A-981D-658B04DED679}" type="slidenum">
               <a:rPr lang="en-US" smtClean="0"/>
-              <a:pPr>
-                <a:defRPr/>
-              </a:pPr>
               <a:t>12</a:t>
             </a:fld>
             <a:endParaRPr lang="en-US"/>
@@ -664,7 +652,7 @@
     </p:spTree>
     <p:extLst>
       <p:ext uri="{BB962C8B-B14F-4D97-AF65-F5344CB8AC3E}">
-        <p14:creationId xmlns:p14="http://schemas.microsoft.com/office/powerpoint/2010/main" val="3914753944"/>
+        <p14:creationId xmlns:p14="http://schemas.microsoft.com/office/powerpoint/2010/main" val="2314245974"/>
       </p:ext>
     </p:extLst>
   </p:cSld>
@@ -729,7 +717,7 @@
             <a:spLocks noGrp="1"/>
           </p:cNvSpPr>
           <p:nvPr>
-            <p:ph type="sldNum" sz="quarter" idx="5"/>
+            <p:ph type="sldNum" sz="quarter" idx="10"/>
           </p:nvPr>
         </p:nvSpPr>
         <p:spPr/>
@@ -739,7 +727,7 @@
           <a:p>
             <a:fld id="{91C65747-E6F5-D94A-981D-658B04DED679}" type="slidenum">
               <a:rPr lang="en-US" smtClean="0"/>
-              <a:t>20</a:t>
+              <a:t>13</a:t>
             </a:fld>
             <a:endParaRPr lang="en-US"/>
           </a:p>
@@ -748,7 +736,7 @@
     </p:spTree>
     <p:extLst>
       <p:ext uri="{BB962C8B-B14F-4D97-AF65-F5344CB8AC3E}">
-        <p14:creationId xmlns:p14="http://schemas.microsoft.com/office/powerpoint/2010/main" val="3971580527"/>
+        <p14:creationId xmlns:p14="http://schemas.microsoft.com/office/powerpoint/2010/main" val="300058873"/>
       </p:ext>
     </p:extLst>
   </p:cSld>
@@ -802,6 +790,104 @@
           <a:bodyPr/>
           <a:lstStyle/>
           <a:p>
+            <a:r>
+              <a:rPr lang="en-US" dirty="0"/>
+              <a:t>We recommend </a:t>
+            </a:r>
+            <a:r>
+              <a:rPr lang="en-US" dirty="0" err="1"/>
+              <a:t>intersection_strict</a:t>
+            </a:r>
+            <a:endParaRPr lang="en-US" dirty="0"/>
+          </a:p>
+        </p:txBody>
+      </p:sp>
+      <p:sp>
+        <p:nvSpPr>
+          <p:cNvPr id="4" name="Slide Number Placeholder 3"/>
+          <p:cNvSpPr>
+            <a:spLocks noGrp="1"/>
+          </p:cNvSpPr>
+          <p:nvPr>
+            <p:ph type="sldNum" sz="quarter" idx="10"/>
+          </p:nvPr>
+        </p:nvSpPr>
+        <p:spPr/>
+        <p:txBody>
+          <a:bodyPr/>
+          <a:lstStyle/>
+          <a:p>
+            <a:pPr>
+              <a:defRPr/>
+            </a:pPr>
+            <a:fld id="{F3969550-FBCF-404B-9FAA-7B1DCDF2C4FF}" type="slidenum">
+              <a:rPr lang="en-US" smtClean="0"/>
+              <a:pPr>
+                <a:defRPr/>
+              </a:pPr>
+              <a:t>14</a:t>
+            </a:fld>
+            <a:endParaRPr lang="en-US"/>
+          </a:p>
+        </p:txBody>
+      </p:sp>
+    </p:spTree>
+    <p:extLst>
+      <p:ext uri="{BB962C8B-B14F-4D97-AF65-F5344CB8AC3E}">
+        <p14:creationId xmlns:p14="http://schemas.microsoft.com/office/powerpoint/2010/main" val="3914753944"/>
+      </p:ext>
+    </p:extLst>
+  </p:cSld>
+  <p:clrMapOvr>
+    <a:masterClrMapping/>
+  </p:clrMapOvr>
+</p:notes>
+</file>
+
+<file path=ppt/notesSlides/notesSlide13.xml><?xml version="1.0" encoding="utf-8"?>
+<p:notes xmlns:a="http://schemas.openxmlformats.org/drawingml/2006/main" xmlns:r="http://schemas.openxmlformats.org/officeDocument/2006/relationships" xmlns:p="http://schemas.openxmlformats.org/presentationml/2006/main">
+  <p:cSld>
+    <p:spTree>
+      <p:nvGrpSpPr>
+        <p:cNvPr id="1" name=""/>
+        <p:cNvGrpSpPr/>
+        <p:nvPr/>
+      </p:nvGrpSpPr>
+      <p:grpSpPr>
+        <a:xfrm>
+          <a:off x="0" y="0"/>
+          <a:ext cx="0" cy="0"/>
+          <a:chOff x="0" y="0"/>
+          <a:chExt cx="0" cy="0"/>
+        </a:xfrm>
+      </p:grpSpPr>
+      <p:sp>
+        <p:nvSpPr>
+          <p:cNvPr id="2" name="Slide Image Placeholder 1"/>
+          <p:cNvSpPr>
+            <a:spLocks noGrp="1" noRot="1" noChangeAspect="1"/>
+          </p:cNvSpPr>
+          <p:nvPr>
+            <p:ph type="sldImg"/>
+          </p:nvPr>
+        </p:nvSpPr>
+        <p:spPr/>
+      </p:sp>
+      <p:sp>
+        <p:nvSpPr>
+          <p:cNvPr id="3" name="Notes Placeholder 2"/>
+          <p:cNvSpPr>
+            <a:spLocks noGrp="1"/>
+          </p:cNvSpPr>
+          <p:nvPr>
+            <p:ph type="body" idx="1"/>
+          </p:nvPr>
+        </p:nvSpPr>
+        <p:spPr/>
+        <p:txBody>
+          <a:bodyPr/>
+          <a:lstStyle/>
+          <a:p>
             <a:endParaRPr lang="en-US" dirty="0"/>
           </a:p>
         </p:txBody>
@@ -832,6 +918,90 @@
     </p:spTree>
     <p:extLst>
       <p:ext uri="{BB962C8B-B14F-4D97-AF65-F5344CB8AC3E}">
+        <p14:creationId xmlns:p14="http://schemas.microsoft.com/office/powerpoint/2010/main" val="3971580527"/>
+      </p:ext>
+    </p:extLst>
+  </p:cSld>
+  <p:clrMapOvr>
+    <a:masterClrMapping/>
+  </p:clrMapOvr>
+</p:notes>
+</file>
+
+<file path=ppt/notesSlides/notesSlide14.xml><?xml version="1.0" encoding="utf-8"?>
+<p:notes xmlns:a="http://schemas.openxmlformats.org/drawingml/2006/main" xmlns:r="http://schemas.openxmlformats.org/officeDocument/2006/relationships" xmlns:p="http://schemas.openxmlformats.org/presentationml/2006/main">
+  <p:cSld>
+    <p:spTree>
+      <p:nvGrpSpPr>
+        <p:cNvPr id="1" name=""/>
+        <p:cNvGrpSpPr/>
+        <p:nvPr/>
+      </p:nvGrpSpPr>
+      <p:grpSpPr>
+        <a:xfrm>
+          <a:off x="0" y="0"/>
+          <a:ext cx="0" cy="0"/>
+          <a:chOff x="0" y="0"/>
+          <a:chExt cx="0" cy="0"/>
+        </a:xfrm>
+      </p:grpSpPr>
+      <p:sp>
+        <p:nvSpPr>
+          <p:cNvPr id="2" name="Slide Image Placeholder 1"/>
+          <p:cNvSpPr>
+            <a:spLocks noGrp="1" noRot="1" noChangeAspect="1"/>
+          </p:cNvSpPr>
+          <p:nvPr>
+            <p:ph type="sldImg"/>
+          </p:nvPr>
+        </p:nvSpPr>
+        <p:spPr/>
+      </p:sp>
+      <p:sp>
+        <p:nvSpPr>
+          <p:cNvPr id="3" name="Notes Placeholder 2"/>
+          <p:cNvSpPr>
+            <a:spLocks noGrp="1"/>
+          </p:cNvSpPr>
+          <p:nvPr>
+            <p:ph type="body" idx="1"/>
+          </p:nvPr>
+        </p:nvSpPr>
+        <p:spPr/>
+        <p:txBody>
+          <a:bodyPr/>
+          <a:lstStyle/>
+          <a:p>
+            <a:endParaRPr lang="en-US" dirty="0"/>
+          </a:p>
+        </p:txBody>
+      </p:sp>
+      <p:sp>
+        <p:nvSpPr>
+          <p:cNvPr id="4" name="Slide Number Placeholder 3"/>
+          <p:cNvSpPr>
+            <a:spLocks noGrp="1"/>
+          </p:cNvSpPr>
+          <p:nvPr>
+            <p:ph type="sldNum" sz="quarter" idx="5"/>
+          </p:nvPr>
+        </p:nvSpPr>
+        <p:spPr/>
+        <p:txBody>
+          <a:bodyPr/>
+          <a:lstStyle/>
+          <a:p>
+            <a:fld id="{91C65747-E6F5-D94A-981D-658B04DED679}" type="slidenum">
+              <a:rPr lang="en-US" smtClean="0"/>
+              <a:t>24</a:t>
+            </a:fld>
+            <a:endParaRPr lang="en-US"/>
+          </a:p>
+        </p:txBody>
+      </p:sp>
+    </p:spTree>
+    <p:extLst>
+      <p:ext uri="{BB962C8B-B14F-4D97-AF65-F5344CB8AC3E}">
         <p14:creationId xmlns:p14="http://schemas.microsoft.com/office/powerpoint/2010/main" val="3637336057"/>
       </p:ext>
     </p:extLst>
@@ -842,7 +1012,7 @@
 </p:notes>
 </file>
 
-<file path=ppt/notesSlides/notesSlide13.xml><?xml version="1.0" encoding="utf-8"?>
+<file path=ppt/notesSlides/notesSlide15.xml><?xml version="1.0" encoding="utf-8"?>
 <p:notes xmlns:a="http://schemas.openxmlformats.org/drawingml/2006/main" xmlns:r="http://schemas.openxmlformats.org/officeDocument/2006/relationships" xmlns:p="http://schemas.openxmlformats.org/presentationml/2006/main" showMasterSp="0" showMasterPhAnim="0">
   <p:cSld>
     <p:spTree>
@@ -992,7 +1162,7 @@
             </a:pPr>
             <a:fld id="{00000000-1234-1234-1234-123412341234}" type="slidenum">
               <a:rPr lang="en-US"/>
-              <a:t>23</a:t>
+              <a:t>25</a:t>
             </a:fld>
             <a:endParaRPr/>
           </a:p>
@@ -1091,7 +1261,7 @@
     </p:spTree>
     <p:extLst>
       <p:ext uri="{BB962C8B-B14F-4D97-AF65-F5344CB8AC3E}">
-        <p14:creationId xmlns:p14="http://schemas.microsoft.com/office/powerpoint/2010/main" val="3652089476"/>
+        <p14:creationId xmlns:p14="http://schemas.microsoft.com/office/powerpoint/2010/main" val="1190592263"/>
       </p:ext>
     </p:extLst>
   </p:cSld>
@@ -1181,7 +1351,7 @@
     </p:spTree>
     <p:extLst>
       <p:ext uri="{BB962C8B-B14F-4D97-AF65-F5344CB8AC3E}">
-        <p14:creationId xmlns:p14="http://schemas.microsoft.com/office/powerpoint/2010/main" val="2867275774"/>
+        <p14:creationId xmlns:p14="http://schemas.microsoft.com/office/powerpoint/2010/main" val="3652089476"/>
       </p:ext>
     </p:extLst>
   </p:cSld>
@@ -1235,10 +1405,7 @@
           <a:bodyPr/>
           <a:lstStyle/>
           <a:p>
-            <a:r>
-              <a:rPr lang="en-US" dirty="0"/>
-              <a:t>When you use TPM, the sum of all TPMs in each sample are the same. This makes it easier to compare the proportion of reads that mapped to a gene in each sample. In contrast, with RPKM and FPKM, the sum of the normalized reads in each sample may be different, and this makes it harder to compare samples directly.</a:t>
-            </a:r>
+            <a:endParaRPr lang="en-US" dirty="0"/>
           </a:p>
         </p:txBody>
       </p:sp>
@@ -1274,7 +1441,7 @@
     </p:spTree>
     <p:extLst>
       <p:ext uri="{BB962C8B-B14F-4D97-AF65-F5344CB8AC3E}">
-        <p14:creationId xmlns:p14="http://schemas.microsoft.com/office/powerpoint/2010/main" val="512950226"/>
+        <p14:creationId xmlns:p14="http://schemas.microsoft.com/office/powerpoint/2010/main" val="2867275774"/>
       </p:ext>
     </p:extLst>
   </p:cSld>
@@ -1329,39 +1496,9 @@
           <a:lstStyle/>
           <a:p>
             <a:r>
-              <a:rPr lang="en-US" sz="1200" b="0" i="0" u="none" strike="noStrike" kern="1200" baseline="0" dirty="0">
-                <a:solidFill>
-                  <a:schemeClr val="tx1"/>
-                </a:solidFill>
-                <a:latin typeface="+mn-lt"/>
-                <a:ea typeface="ＭＳ Ｐゴシック" pitchFamily="-28" charset="-128"/>
-                <a:cs typeface="ＭＳ Ｐゴシック" pitchFamily="-28" charset="-128"/>
-              </a:rPr>
-              <a:t>The StringTie algorithm: RNA-</a:t>
-            </a:r>
-            <a:r>
-              <a:rPr lang="en-US" sz="1200" b="0" i="0" u="none" strike="noStrike" kern="1200" baseline="0" dirty="0" err="1">
-                <a:solidFill>
-                  <a:schemeClr val="tx1"/>
-                </a:solidFill>
-                <a:latin typeface="+mn-lt"/>
-                <a:ea typeface="ＭＳ Ｐゴシック" pitchFamily="-28" charset="-128"/>
-                <a:cs typeface="ＭＳ Ｐゴシック" pitchFamily="-28" charset="-128"/>
-              </a:rPr>
-              <a:t>seq</a:t>
-            </a:r>
-            <a:r>
-              <a:rPr lang="en-US" sz="1200" b="0" i="0" u="none" strike="noStrike" kern="1200" baseline="0" dirty="0">
-                <a:solidFill>
-                  <a:schemeClr val="tx1"/>
-                </a:solidFill>
-                <a:latin typeface="+mn-lt"/>
-                <a:ea typeface="ＭＳ Ｐゴシック" pitchFamily="-28" charset="-128"/>
-                <a:cs typeface="ＭＳ Ｐゴシック" pitchFamily="-28" charset="-128"/>
-              </a:rPr>
-              <a:t> reads are assembled into super-reads (Step 1) and then super-reads plus un-assembled reads are mapped to the genome (Step 2). In Step 3, mapped reads and super-reads are used to build an alternative splice graph. We use the path from source (s) to sink (t) with the heaviest coverage to build a flow network corresponding to the transcript represented by that path (Step 4). The maximum flow in this network represents the coverage of one assembled transcript, which is removed from the splice graph (Step 5). Steps 4 and 5 are repeated until no more transcripts can be assembled. </a:t>
-            </a:r>
-            <a:endParaRPr lang="en-US" dirty="0"/>
+              <a:rPr lang="en-US" dirty="0"/>
+              <a:t>When you use TPM, the sum of all TPMs in each sample are the same. This makes it easier to compare the proportion of reads that mapped to a gene in each sample. In contrast, with RPKM and FPKM, the sum of the normalized reads in each sample may be different, and this makes it harder to compare samples directly.</a:t>
+            </a:r>
           </a:p>
         </p:txBody>
       </p:sp>
@@ -1383,7 +1520,7 @@
             <a:pPr>
               <a:defRPr/>
             </a:pPr>
-            <a:fld id="{F3969550-FBCF-404B-9FAA-7B1DCDF2C4FF}" type="slidenum">
+            <a:fld id="{58FBEE90-0CDA-3447-B595-4F8759630F3A}" type="slidenum">
               <a:rPr lang="en-US" smtClean="0"/>
               <a:pPr>
                 <a:defRPr/>
@@ -1397,7 +1534,7 @@
     </p:spTree>
     <p:extLst>
       <p:ext uri="{BB962C8B-B14F-4D97-AF65-F5344CB8AC3E}">
-        <p14:creationId xmlns:p14="http://schemas.microsoft.com/office/powerpoint/2010/main" val="1197420487"/>
+        <p14:creationId xmlns:p14="http://schemas.microsoft.com/office/powerpoint/2010/main" val="512950226"/>
       </p:ext>
     </p:extLst>
   </p:cSld>
@@ -1460,7 +1597,29 @@
                 <a:ea typeface="ＭＳ Ｐゴシック" pitchFamily="-28" charset="-128"/>
                 <a:cs typeface="ＭＳ Ｐゴシック" pitchFamily="-28" charset="-128"/>
               </a:rPr>
-              <a:t>Flow network associated with a transcript (shown with colored nodes). 15 fragments (shown in grey) align to the transcript. Two nodes in the flow network are connected if a fragment starts and ends at those nodes. E.g., nodes 1 and 5 are connected because fragment (a) starts at node 1 and ends at node 5. For each colored node in the transcript, two nodes are created in the flow network. Capacities on edges (not connecting source or sink) are shown in red. </a:t>
+              <a:t>The </a:t>
+            </a:r>
+            <a:r>
+              <a:rPr lang="en-US" sz="1200" b="0" i="0" u="none" strike="noStrike" kern="1200" baseline="0" dirty="0" err="1">
+                <a:solidFill>
+                  <a:schemeClr val="tx1"/>
+                </a:solidFill>
+                <a:latin typeface="+mn-lt"/>
+                <a:ea typeface="ＭＳ Ｐゴシック" pitchFamily="-28" charset="-128"/>
+                <a:cs typeface="ＭＳ Ｐゴシック" pitchFamily="-28" charset="-128"/>
+              </a:rPr>
+              <a:t>StringTie</a:t>
+            </a:r>
+            <a:r>
+              <a:rPr lang="en-US" sz="1200" b="0" i="0" u="none" strike="noStrike" kern="1200" baseline="0" dirty="0">
+                <a:solidFill>
+                  <a:schemeClr val="tx1"/>
+                </a:solidFill>
+                <a:latin typeface="+mn-lt"/>
+                <a:ea typeface="ＭＳ Ｐゴシック" pitchFamily="-28" charset="-128"/>
+                <a:cs typeface="ＭＳ Ｐゴシック" pitchFamily="-28" charset="-128"/>
+              </a:rPr>
+              <a:t> algorithm optionally accepts RNA-seq reads that are assembled into super-reads (Step 1). </a:t>
             </a:r>
           </a:p>
           <a:p>
@@ -1483,7 +1642,7 @@
                 <a:ea typeface="ＭＳ Ｐゴシック" pitchFamily="-28" charset="-128"/>
                 <a:cs typeface="ＭＳ Ｐゴシック" pitchFamily="-28" charset="-128"/>
               </a:rPr>
-              <a:t>In the first node (corresponding to exon1) there are 7 fragments. One of these fragments is connected to exon5 (starts at beginning of exon1 and ends at end of exon5), while 6 fragments are connected to exon3. In the second node (corresponding to exon3) there are 13 fragments, of which 3 are connected to exon 5. The final node (corresponding to exon5) has 4 supporting fragments. The maximum flow is clearly 1 – 3 – 5. </a:t>
+              <a:t>Super-reads plus un-assembled reads or just un-assembled reads (if skipping super-read assembly step) are mapped to the genome (Step 2). </a:t>
             </a:r>
           </a:p>
           <a:p>
@@ -1506,7 +1665,7 @@
                 <a:ea typeface="ＭＳ Ｐゴシック" pitchFamily="-28" charset="-128"/>
                 <a:cs typeface="ＭＳ Ｐゴシック" pitchFamily="-28" charset="-128"/>
               </a:rPr>
-              <a:t>StringTie estimates the coverage level of the transcript by solving a maximum-flow problem that determines the maximum number of fragments that can be associated with the chosen transcript. </a:t>
+              <a:t>In Step 3, mapped reads (and super-reads) are grouped into clusters. Basically, any reads aligned within some minimum distance (configurable) are grouped together. Each cluster is used to build an alternative splice graph (ASG). The ASG captures all possible transcripts that are consistent with the mapped reads, where nodes in the graph correspond to contiguous regions of the genome that are uninterrupted by any spliced read alignment, and directed edges correspond to reads that align across two such nodes in the correct 5′ to 3′ order. </a:t>
             </a:r>
           </a:p>
           <a:p>
@@ -1521,9 +1680,40 @@
           </a:p>
           <a:p>
             <a:r>
-              <a:rPr lang="en-US" dirty="0"/>
-              <a:t>The maximum flow problem is a well-studied problem in optimization theory.</a:t>
-            </a:r>
+              <a:rPr lang="en-US" sz="1200" b="0" i="0" u="none" strike="noStrike" kern="1200" baseline="0" dirty="0">
+                <a:solidFill>
+                  <a:schemeClr val="tx1"/>
+                </a:solidFill>
+                <a:latin typeface="+mn-lt"/>
+                <a:ea typeface="ＭＳ Ｐゴシック" pitchFamily="-28" charset="-128"/>
+                <a:cs typeface="ＭＳ Ｐゴシック" pitchFamily="-28" charset="-128"/>
+              </a:rPr>
+              <a:t>The path from source (s) to sink (t) with the heaviest coverage is used to build a flow network corresponding to the transcript represented by that path (Step 4). </a:t>
+            </a:r>
+          </a:p>
+          <a:p>
+            <a:endParaRPr lang="en-US" sz="1200" b="0" i="0" u="none" strike="noStrike" kern="1200" baseline="0" dirty="0">
+              <a:solidFill>
+                <a:schemeClr val="tx1"/>
+              </a:solidFill>
+              <a:latin typeface="+mn-lt"/>
+              <a:ea typeface="ＭＳ Ｐゴシック" pitchFamily="-28" charset="-128"/>
+              <a:cs typeface="ＭＳ Ｐゴシック" pitchFamily="-28" charset="-128"/>
+            </a:endParaRPr>
+          </a:p>
+          <a:p>
+            <a:r>
+              <a:rPr lang="en-US" sz="1200" b="0" i="0" u="none" strike="noStrike" kern="1200" baseline="0" dirty="0">
+                <a:solidFill>
+                  <a:schemeClr val="tx1"/>
+                </a:solidFill>
+                <a:latin typeface="+mn-lt"/>
+                <a:ea typeface="ＭＳ Ｐゴシック" pitchFamily="-28" charset="-128"/>
+                <a:cs typeface="ＭＳ Ｐゴシック" pitchFamily="-28" charset="-128"/>
+              </a:rPr>
+              <a:t>The maximum flow in this network represents the coverage of one assembled transcript, which is removed from the splice graph (Step 5). Steps 4 and 5 are repeated until no more transcripts can be assembled. </a:t>
+            </a:r>
+            <a:endParaRPr lang="en-US" dirty="0"/>
           </a:p>
         </p:txBody>
       </p:sp>
@@ -1559,7 +1749,7 @@
     </p:spTree>
     <p:extLst>
       <p:ext uri="{BB962C8B-B14F-4D97-AF65-F5344CB8AC3E}">
-        <p14:creationId xmlns:p14="http://schemas.microsoft.com/office/powerpoint/2010/main" val="1651807942"/>
+        <p14:creationId xmlns:p14="http://schemas.microsoft.com/office/powerpoint/2010/main" val="1197420487"/>
       </p:ext>
     </p:extLst>
   </p:cSld>
@@ -1613,7 +1803,79 @@
           <a:bodyPr/>
           <a:lstStyle/>
           <a:p>
-            <a:endParaRPr lang="en-US" dirty="0"/>
+            <a:r>
+              <a:rPr lang="en-US" sz="1200" b="0" i="0" u="none" strike="noStrike" kern="1200" baseline="0" dirty="0">
+                <a:solidFill>
+                  <a:schemeClr val="tx1"/>
+                </a:solidFill>
+                <a:latin typeface="+mn-lt"/>
+                <a:ea typeface="ＭＳ Ｐゴシック" pitchFamily="-28" charset="-128"/>
+                <a:cs typeface="ＭＳ Ｐゴシック" pitchFamily="-28" charset="-128"/>
+              </a:rPr>
+              <a:t>Flow network associated with a transcript (shown with colored nodes). 15 fragments (shown in grey) align to the transcript. Two nodes in the flow network are connected if a fragment starts and ends at those nodes. E.g., nodes 1 and 5 are connected because fragment (a) starts at node 1 and ends at node 5. For each colored node in the transcript, two nodes are created in the flow network. Capacities on edges (not connecting source or sink) are shown in red. </a:t>
+            </a:r>
+          </a:p>
+          <a:p>
+            <a:endParaRPr lang="en-US" sz="1200" b="0" i="0" u="none" strike="noStrike" kern="1200" baseline="0" dirty="0">
+              <a:solidFill>
+                <a:schemeClr val="tx1"/>
+              </a:solidFill>
+              <a:latin typeface="+mn-lt"/>
+              <a:ea typeface="ＭＳ Ｐゴシック" pitchFamily="-28" charset="-128"/>
+              <a:cs typeface="ＭＳ Ｐゴシック" pitchFamily="-28" charset="-128"/>
+            </a:endParaRPr>
+          </a:p>
+          <a:p>
+            <a:r>
+              <a:rPr lang="en-US" sz="1200" b="0" i="0" u="none" strike="noStrike" kern="1200" baseline="0" dirty="0">
+                <a:solidFill>
+                  <a:schemeClr val="tx1"/>
+                </a:solidFill>
+                <a:latin typeface="+mn-lt"/>
+                <a:ea typeface="ＭＳ Ｐゴシック" pitchFamily="-28" charset="-128"/>
+                <a:cs typeface="ＭＳ Ｐゴシック" pitchFamily="-28" charset="-128"/>
+              </a:rPr>
+              <a:t>In the first node (corresponding to exon1) there are 7 fragments. One of these fragments is connected to exon5 (starts at beginning of exon1 and ends at end of exon5), while 6 fragments are connected to exon3. In the second node (corresponding to exon3) there are 13 fragments, of which 3 are connected to exon 5. The final node (corresponding to exon5) has 4 supporting fragments. The maximum flow is clearly 1 – 3 – 5. </a:t>
+            </a:r>
+          </a:p>
+          <a:p>
+            <a:endParaRPr lang="en-US" sz="1200" b="0" i="0" u="none" strike="noStrike" kern="1200" baseline="0" dirty="0">
+              <a:solidFill>
+                <a:schemeClr val="tx1"/>
+              </a:solidFill>
+              <a:latin typeface="+mn-lt"/>
+              <a:ea typeface="ＭＳ Ｐゴシック" pitchFamily="-28" charset="-128"/>
+              <a:cs typeface="ＭＳ Ｐゴシック" pitchFamily="-28" charset="-128"/>
+            </a:endParaRPr>
+          </a:p>
+          <a:p>
+            <a:r>
+              <a:rPr lang="en-US" sz="1200" b="0" i="0" u="none" strike="noStrike" kern="1200" baseline="0" dirty="0">
+                <a:solidFill>
+                  <a:schemeClr val="tx1"/>
+                </a:solidFill>
+                <a:latin typeface="+mn-lt"/>
+                <a:ea typeface="ＭＳ Ｐゴシック" pitchFamily="-28" charset="-128"/>
+                <a:cs typeface="ＭＳ Ｐゴシック" pitchFamily="-28" charset="-128"/>
+              </a:rPr>
+              <a:t>StringTie estimates the coverage level of the transcript by solving a maximum-flow problem that determines the maximum number of fragments that can be associated with the chosen transcript. </a:t>
+            </a:r>
+          </a:p>
+          <a:p>
+            <a:endParaRPr lang="en-US" sz="1200" b="0" i="0" u="none" strike="noStrike" kern="1200" baseline="0" dirty="0">
+              <a:solidFill>
+                <a:schemeClr val="tx1"/>
+              </a:solidFill>
+              <a:latin typeface="+mn-lt"/>
+              <a:ea typeface="ＭＳ Ｐゴシック" pitchFamily="-28" charset="-128"/>
+              <a:cs typeface="ＭＳ Ｐゴシック" pitchFamily="-28" charset="-128"/>
+            </a:endParaRPr>
+          </a:p>
+          <a:p>
+            <a:r>
+              <a:rPr lang="en-US" dirty="0"/>
+              <a:t>The maximum flow problem is a well-studied problem in optimization theory.</a:t>
+            </a:r>
           </a:p>
         </p:txBody>
       </p:sp>
@@ -1624,7 +1886,7 @@
             <a:spLocks noGrp="1"/>
           </p:cNvSpPr>
           <p:nvPr>
-            <p:ph type="sldNum" sz="quarter" idx="5"/>
+            <p:ph type="sldNum" sz="quarter" idx="10"/>
           </p:nvPr>
         </p:nvSpPr>
         <p:spPr/>
@@ -1632,8 +1894,14 @@
           <a:bodyPr/>
           <a:lstStyle/>
           <a:p>
-            <a:fld id="{91C65747-E6F5-D94A-981D-658B04DED679}" type="slidenum">
+            <a:pPr>
+              <a:defRPr/>
+            </a:pPr>
+            <a:fld id="{F3969550-FBCF-404B-9FAA-7B1DCDF2C4FF}" type="slidenum">
               <a:rPr lang="en-US" smtClean="0"/>
+              <a:pPr>
+                <a:defRPr/>
+              </a:pPr>
               <a:t>9</a:t>
             </a:fld>
             <a:endParaRPr lang="en-US"/>
@@ -1643,7 +1911,7 @@
     </p:spTree>
     <p:extLst>
       <p:ext uri="{BB962C8B-B14F-4D97-AF65-F5344CB8AC3E}">
-        <p14:creationId xmlns:p14="http://schemas.microsoft.com/office/powerpoint/2010/main" val="576724302"/>
+        <p14:creationId xmlns:p14="http://schemas.microsoft.com/office/powerpoint/2010/main" val="1651807942"/>
       </p:ext>
     </p:extLst>
   </p:cSld>
@@ -1727,7 +1995,7 @@
     </p:spTree>
     <p:extLst>
       <p:ext uri="{BB962C8B-B14F-4D97-AF65-F5344CB8AC3E}">
-        <p14:creationId xmlns:p14="http://schemas.microsoft.com/office/powerpoint/2010/main" val="2314245974"/>
+        <p14:creationId xmlns:p14="http://schemas.microsoft.com/office/powerpoint/2010/main" val="1359088750"/>
       </p:ext>
     </p:extLst>
   </p:cSld>
@@ -1792,7 +2060,7 @@
             <a:spLocks noGrp="1"/>
           </p:cNvSpPr>
           <p:nvPr>
-            <p:ph type="sldNum" sz="quarter" idx="10"/>
+            <p:ph type="sldNum" sz="quarter" idx="5"/>
           </p:nvPr>
         </p:nvSpPr>
         <p:spPr/>
@@ -1811,7 +2079,7 @@
     </p:spTree>
     <p:extLst>
       <p:ext uri="{BB962C8B-B14F-4D97-AF65-F5344CB8AC3E}">
-        <p14:creationId xmlns:p14="http://schemas.microsoft.com/office/powerpoint/2010/main" val="300058873"/>
+        <p14:creationId xmlns:p14="http://schemas.microsoft.com/office/powerpoint/2010/main" val="576724302"/>
       </p:ext>
     </p:extLst>
   </p:cSld>
@@ -4576,6 +4844,363 @@
           <a:p>
             <a:pPr algn="ctr"/>
             <a:r>
+              <a:rPr lang="en-US" b="1" dirty="0" err="1">
+                <a:latin typeface="Calibri" panose="020F0502020204030204" pitchFamily="34" charset="0"/>
+                <a:cs typeface="Calibri" panose="020F0502020204030204" pitchFamily="34" charset="0"/>
+              </a:rPr>
+              <a:t>StringTie</a:t>
+            </a:r>
+            <a:r>
+              <a:rPr lang="en-US" b="1" dirty="0">
+                <a:latin typeface="Calibri" panose="020F0502020204030204" pitchFamily="34" charset="0"/>
+                <a:cs typeface="Calibri" panose="020F0502020204030204" pitchFamily="34" charset="0"/>
+              </a:rPr>
+              <a:t> Modes</a:t>
+            </a:r>
+          </a:p>
+        </p:txBody>
+      </p:sp>
+      <p:sp>
+        <p:nvSpPr>
+          <p:cNvPr id="3" name="Content Placeholder 2"/>
+          <p:cNvSpPr>
+            <a:spLocks noGrp="1"/>
+          </p:cNvSpPr>
+          <p:nvPr>
+            <p:ph idx="1"/>
+          </p:nvPr>
+        </p:nvSpPr>
+        <p:spPr/>
+        <p:txBody>
+          <a:bodyPr>
+            <a:normAutofit fontScale="92500" lnSpcReduction="20000"/>
+          </a:bodyPr>
+          <a:lstStyle/>
+          <a:p>
+            <a:r>
+              <a:rPr lang="en-US" dirty="0"/>
+              <a:t>Expression estimation mode (“Reference Only”)</a:t>
+            </a:r>
+          </a:p>
+          <a:p>
+            <a:pPr lvl="1"/>
+            <a:r>
+              <a:rPr lang="en-US" dirty="0"/>
+              <a:t>“–G $</a:t>
+            </a:r>
+            <a:r>
+              <a:rPr lang="en-US" dirty="0" err="1"/>
+              <a:t>GTF_File</a:t>
+            </a:r>
+            <a:r>
+              <a:rPr lang="en-US" dirty="0"/>
+              <a:t>” AND “–e” option</a:t>
+            </a:r>
+          </a:p>
+          <a:p>
+            <a:pPr lvl="1"/>
+            <a:r>
+              <a:rPr lang="en-US" dirty="0"/>
+              <a:t>no "novel" transcript assemblies (isoforms) </a:t>
+            </a:r>
+          </a:p>
+          <a:p>
+            <a:pPr lvl="1"/>
+            <a:r>
+              <a:rPr lang="en-US" dirty="0"/>
+              <a:t>read alignments not overlapping reference transcripts ignored</a:t>
+            </a:r>
+          </a:p>
+          <a:p>
+            <a:pPr lvl="1"/>
+            <a:r>
+              <a:rPr lang="en-US" dirty="0"/>
+              <a:t>Faster, especially when given limited set of reference transcripts</a:t>
+            </a:r>
+          </a:p>
+          <a:p>
+            <a:pPr lvl="2"/>
+            <a:r>
+              <a:rPr lang="en-US" dirty="0"/>
+              <a:t>Avoids complicated steps of clustering and building alternative splice graph from scratch, skipping straight to abundance estimation</a:t>
+            </a:r>
+          </a:p>
+          <a:p>
+            <a:r>
+              <a:rPr lang="en-US" dirty="0"/>
+              <a:t>“Reference guided mode”</a:t>
+            </a:r>
+          </a:p>
+          <a:p>
+            <a:pPr lvl="1"/>
+            <a:r>
+              <a:rPr lang="en-US" dirty="0"/>
+              <a:t> “–G $</a:t>
+            </a:r>
+            <a:r>
+              <a:rPr lang="en-US" dirty="0" err="1"/>
+              <a:t>GTF_File</a:t>
+            </a:r>
+            <a:r>
+              <a:rPr lang="en-US" dirty="0"/>
+              <a:t>” WITHOUT “–e” option</a:t>
+            </a:r>
+          </a:p>
+          <a:p>
+            <a:pPr lvl="1"/>
+            <a:r>
+              <a:rPr lang="en-US" dirty="0"/>
+              <a:t>Both known and novel transcript assemblies</a:t>
+            </a:r>
+          </a:p>
+          <a:p>
+            <a:r>
+              <a:rPr lang="en-US" dirty="0"/>
+              <a:t>“De novo” mode</a:t>
+            </a:r>
+          </a:p>
+          <a:p>
+            <a:pPr lvl="1"/>
+            <a:r>
+              <a:rPr lang="en-US" dirty="0"/>
+              <a:t>NEITHER “–G $</a:t>
+            </a:r>
+            <a:r>
+              <a:rPr lang="en-US" dirty="0" err="1"/>
+              <a:t>GTF_File</a:t>
+            </a:r>
+            <a:r>
+              <a:rPr lang="en-US" dirty="0"/>
+              <a:t>” NOR “–e” option</a:t>
+            </a:r>
+          </a:p>
+          <a:p>
+            <a:pPr lvl="1"/>
+            <a:r>
+              <a:rPr lang="en-US" dirty="0"/>
+              <a:t>Novel transcript assemblies only</a:t>
+            </a:r>
+          </a:p>
+        </p:txBody>
+      </p:sp>
+      <p:sp>
+        <p:nvSpPr>
+          <p:cNvPr id="4" name="TextBox 3"/>
+          <p:cNvSpPr txBox="1"/>
+          <p:nvPr/>
+        </p:nvSpPr>
+        <p:spPr>
+          <a:xfrm>
+            <a:off x="6240016" y="6021288"/>
+            <a:ext cx="4427984" cy="369332"/>
+          </a:xfrm>
+          <a:prstGeom prst="rect">
+            <a:avLst/>
+          </a:prstGeom>
+          <a:noFill/>
+        </p:spPr>
+        <p:txBody>
+          <a:bodyPr wrap="square" rtlCol="0">
+            <a:spAutoFit/>
+          </a:bodyPr>
+          <a:lstStyle/>
+          <a:p>
+            <a:r>
+              <a:rPr lang="en-US" dirty="0" err="1"/>
+              <a:t>Pertea</a:t>
+            </a:r>
+            <a:r>
+              <a:rPr lang="en-US" dirty="0"/>
+              <a:t> et al. Nature Protocols, 2016</a:t>
+            </a:r>
+          </a:p>
+        </p:txBody>
+      </p:sp>
+    </p:spTree>
+    <p:extLst>
+      <p:ext uri="{BB962C8B-B14F-4D97-AF65-F5344CB8AC3E}">
+        <p14:creationId xmlns:p14="http://schemas.microsoft.com/office/powerpoint/2010/main" val="3532015058"/>
+      </p:ext>
+    </p:extLst>
+  </p:cSld>
+  <p:clrMapOvr>
+    <a:masterClrMapping/>
+  </p:clrMapOvr>
+</p:sld>
+</file>
+
+<file path=ppt/slides/slide11.xml><?xml version="1.0" encoding="utf-8"?>
+<p:sld xmlns:a="http://schemas.openxmlformats.org/drawingml/2006/main" xmlns:r="http://schemas.openxmlformats.org/officeDocument/2006/relationships" xmlns:p="http://schemas.openxmlformats.org/presentationml/2006/main">
+  <p:cSld>
+    <p:spTree>
+      <p:nvGrpSpPr>
+        <p:cNvPr id="1" name=""/>
+        <p:cNvGrpSpPr/>
+        <p:nvPr/>
+      </p:nvGrpSpPr>
+      <p:grpSpPr>
+        <a:xfrm>
+          <a:off x="0" y="0"/>
+          <a:ext cx="0" cy="0"/>
+          <a:chOff x="0" y="0"/>
+          <a:chExt cx="0" cy="0"/>
+        </a:xfrm>
+      </p:grpSpPr>
+      <p:sp>
+        <p:nvSpPr>
+          <p:cNvPr id="2" name="Title 1"/>
+          <p:cNvSpPr>
+            <a:spLocks noGrp="1"/>
+          </p:cNvSpPr>
+          <p:nvPr>
+            <p:ph type="title"/>
+          </p:nvPr>
+        </p:nvSpPr>
+        <p:spPr/>
+        <p:txBody>
+          <a:bodyPr/>
+          <a:lstStyle/>
+          <a:p>
+            <a:pPr algn="ctr"/>
+            <a:r>
+              <a:rPr lang="en-US" b="1" dirty="0">
+                <a:latin typeface="Calibri" panose="020F0502020204030204" pitchFamily="34" charset="0"/>
+                <a:cs typeface="Calibri" panose="020F0502020204030204" pitchFamily="34" charset="0"/>
+              </a:rPr>
+              <a:t>StringTie -merge</a:t>
+            </a:r>
+          </a:p>
+        </p:txBody>
+      </p:sp>
+      <p:sp>
+        <p:nvSpPr>
+          <p:cNvPr id="3" name="Content Placeholder 2"/>
+          <p:cNvSpPr>
+            <a:spLocks noGrp="1"/>
+          </p:cNvSpPr>
+          <p:nvPr>
+            <p:ph idx="1"/>
+          </p:nvPr>
+        </p:nvSpPr>
+        <p:spPr/>
+        <p:txBody>
+          <a:bodyPr/>
+          <a:lstStyle/>
+          <a:p>
+            <a:r>
+              <a:rPr lang="en-US" dirty="0"/>
+              <a:t>Merge together all gene structures from all samples</a:t>
+            </a:r>
+          </a:p>
+          <a:p>
+            <a:pPr lvl="1"/>
+            <a:r>
+              <a:rPr lang="en-US" dirty="0"/>
+              <a:t>Some samples may only partially represent a gene structure</a:t>
+            </a:r>
+            <a:br>
+              <a:rPr lang="en-US" dirty="0"/>
+            </a:br>
+            <a:endParaRPr lang="en-US" dirty="0"/>
+          </a:p>
+          <a:p>
+            <a:r>
+              <a:rPr lang="en-US" dirty="0"/>
+              <a:t>Incorporates known transcripts with assembled, potentially novel transcripts</a:t>
+            </a:r>
+            <a:br>
+              <a:rPr lang="en-US" dirty="0"/>
+            </a:br>
+            <a:endParaRPr lang="en-US" dirty="0"/>
+          </a:p>
+          <a:p>
+            <a:r>
+              <a:rPr lang="en-US" dirty="0"/>
+              <a:t>For de novo or reference guided mode, we will rerun StringTie with the merged transcript assembly.</a:t>
+            </a:r>
+          </a:p>
+        </p:txBody>
+      </p:sp>
+      <p:sp>
+        <p:nvSpPr>
+          <p:cNvPr id="4" name="TextBox 3"/>
+          <p:cNvSpPr txBox="1"/>
+          <p:nvPr/>
+        </p:nvSpPr>
+        <p:spPr>
+          <a:xfrm>
+            <a:off x="6240016" y="6021288"/>
+            <a:ext cx="4427984" cy="369332"/>
+          </a:xfrm>
+          <a:prstGeom prst="rect">
+            <a:avLst/>
+          </a:prstGeom>
+          <a:noFill/>
+        </p:spPr>
+        <p:txBody>
+          <a:bodyPr wrap="square" rtlCol="0">
+            <a:spAutoFit/>
+          </a:bodyPr>
+          <a:lstStyle/>
+          <a:p>
+            <a:r>
+              <a:rPr lang="en-US" dirty="0" err="1"/>
+              <a:t>Pertea</a:t>
+            </a:r>
+            <a:r>
+              <a:rPr lang="en-US" dirty="0"/>
+              <a:t> et al. Nature Protocols, 2016</a:t>
+            </a:r>
+          </a:p>
+        </p:txBody>
+      </p:sp>
+    </p:spTree>
+    <p:extLst>
+      <p:ext uri="{BB962C8B-B14F-4D97-AF65-F5344CB8AC3E}">
+        <p14:creationId xmlns:p14="http://schemas.microsoft.com/office/powerpoint/2010/main" val="3490153317"/>
+      </p:ext>
+    </p:extLst>
+  </p:cSld>
+  <p:clrMapOvr>
+    <a:masterClrMapping/>
+  </p:clrMapOvr>
+</p:sld>
+</file>
+
+<file path=ppt/slides/slide12.xml><?xml version="1.0" encoding="utf-8"?>
+<p:sld xmlns:a="http://schemas.openxmlformats.org/drawingml/2006/main" xmlns:r="http://schemas.openxmlformats.org/officeDocument/2006/relationships" xmlns:p="http://schemas.openxmlformats.org/presentationml/2006/main">
+  <p:cSld>
+    <p:spTree>
+      <p:nvGrpSpPr>
+        <p:cNvPr id="1" name=""/>
+        <p:cNvGrpSpPr/>
+        <p:nvPr/>
+      </p:nvGrpSpPr>
+      <p:grpSpPr>
+        <a:xfrm>
+          <a:off x="0" y="0"/>
+          <a:ext cx="0" cy="0"/>
+          <a:chOff x="0" y="0"/>
+          <a:chExt cx="0" cy="0"/>
+        </a:xfrm>
+      </p:grpSpPr>
+      <p:sp>
+        <p:nvSpPr>
+          <p:cNvPr id="2" name="Title 1"/>
+          <p:cNvSpPr>
+            <a:spLocks noGrp="1"/>
+          </p:cNvSpPr>
+          <p:nvPr>
+            <p:ph type="title"/>
+          </p:nvPr>
+        </p:nvSpPr>
+        <p:spPr/>
+        <p:txBody>
+          <a:bodyPr/>
+          <a:lstStyle/>
+          <a:p>
+            <a:pPr algn="ctr"/>
+            <a:r>
               <a:rPr lang="en-US" b="1" dirty="0" err="1"/>
               <a:t>gffcompare</a:t>
             </a:r>
@@ -4715,7 +5340,7 @@
 </p:sld>
 </file>
 
-<file path=ppt/slides/slide11.xml><?xml version="1.0" encoding="utf-8"?>
+<file path=ppt/slides/slide13.xml><?xml version="1.0" encoding="utf-8"?>
 <p:sld xmlns:a="http://schemas.openxmlformats.org/drawingml/2006/main" xmlns:r="http://schemas.openxmlformats.org/officeDocument/2006/relationships" xmlns:p="http://schemas.openxmlformats.org/presentationml/2006/main">
   <p:cSld>
     <p:spTree>
@@ -5093,7 +5718,7 @@
 </p:sld>
 </file>
 
-<file path=ppt/slides/slide12.xml><?xml version="1.0" encoding="utf-8"?>
+<file path=ppt/slides/slide14.xml><?xml version="1.0" encoding="utf-8"?>
 <p:sld xmlns:a="http://schemas.openxmlformats.org/drawingml/2006/main" xmlns:r="http://schemas.openxmlformats.org/officeDocument/2006/relationships" xmlns:p="http://schemas.openxmlformats.org/presentationml/2006/main">
   <p:cSld>
     <p:spTree>
@@ -5425,7 +6050,7 @@
 </p:sld>
 </file>
 
-<file path=ppt/slides/slide13.xml><?xml version="1.0" encoding="utf-8"?>
+<file path=ppt/slides/slide15.xml><?xml version="1.0" encoding="utf-8"?>
 <p:sld xmlns:a="http://schemas.openxmlformats.org/drawingml/2006/main" xmlns:r="http://schemas.openxmlformats.org/officeDocument/2006/relationships" xmlns:p="http://schemas.openxmlformats.org/presentationml/2006/main">
   <p:cSld>
     <p:spTree>
@@ -5601,7 +6226,7 @@
 </p:sld>
 </file>
 
-<file path=ppt/slides/slide14.xml><?xml version="1.0" encoding="utf-8"?>
+<file path=ppt/slides/slide16.xml><?xml version="1.0" encoding="utf-8"?>
 <p:sld xmlns:a="http://schemas.openxmlformats.org/drawingml/2006/main" xmlns:r="http://schemas.openxmlformats.org/officeDocument/2006/relationships" xmlns:p="http://schemas.openxmlformats.org/presentationml/2006/main">
   <p:cSld>
     <p:spTree>
@@ -5725,7 +6350,7 @@
           <a:p>
             <a:r>
               <a:rPr lang="en-US" sz="2400" dirty="0"/>
-              <a:t>We adjust for multiple testing by reporting q-values: </a:t>
+              <a:t>Adjust for multiple testing by reporting q-values: </a:t>
             </a:r>
           </a:p>
           <a:p>
@@ -5782,7 +6407,7 @@
 </p:sld>
 </file>
 
-<file path=ppt/slides/slide15.xml><?xml version="1.0" encoding="utf-8"?>
+<file path=ppt/slides/slide17.xml><?xml version="1.0" encoding="utf-8"?>
 <p:sld xmlns:a="http://schemas.openxmlformats.org/drawingml/2006/main" xmlns:r="http://schemas.openxmlformats.org/officeDocument/2006/relationships" xmlns:p="http://schemas.openxmlformats.org/presentationml/2006/main">
   <p:cSld>
     <p:spTree>
@@ -5972,7 +6597,7 @@
 </p:sld>
 </file>
 
-<file path=ppt/slides/slide16.xml><?xml version="1.0" encoding="utf-8"?>
+<file path=ppt/slides/slide18.xml><?xml version="1.0" encoding="utf-8"?>
 <p:sld xmlns:a="http://schemas.openxmlformats.org/drawingml/2006/main" xmlns:r="http://schemas.openxmlformats.org/officeDocument/2006/relationships" xmlns:p="http://schemas.openxmlformats.org/presentationml/2006/main">
   <p:cSld>
     <p:spTree>
@@ -6160,7 +6785,7 @@
 </p:sld>
 </file>
 
-<file path=ppt/slides/slide17.xml><?xml version="1.0" encoding="utf-8"?>
+<file path=ppt/slides/slide19.xml><?xml version="1.0" encoding="utf-8"?>
 <p:sld xmlns:a="http://schemas.openxmlformats.org/drawingml/2006/main" xmlns:r="http://schemas.openxmlformats.org/officeDocument/2006/relationships" xmlns:p="http://schemas.openxmlformats.org/presentationml/2006/main">
   <p:cSld>
     <p:spTree>
@@ -6227,7 +6852,9 @@
           </a:xfrm>
         </p:spPr>
         <p:txBody>
-          <a:bodyPr/>
+          <a:bodyPr>
+            <a:normAutofit lnSpcReduction="10000"/>
+          </a:bodyPr>
           <a:lstStyle/>
           <a:p>
             <a:r>
@@ -6358,7 +6985,24 @@
                 <a:latin typeface="Calibri" charset="0"/>
                 <a:ea typeface="ＭＳ Ｐゴシック" charset="0"/>
               </a:rPr>
-              <a:t>More robust statistical methods for differential expression</a:t>
+              <a:t>“More robust" statistical methods for differential expression</a:t>
+            </a:r>
+          </a:p>
+          <a:p>
+            <a:pPr lvl="2"/>
+            <a:r>
+              <a:rPr lang="en-US" dirty="0" err="1">
+                <a:latin typeface="Calibri" charset="0"/>
+                <a:ea typeface="ＭＳ Ｐゴシック" charset="0"/>
+              </a:rPr>
+              <a:t>Stringtie</a:t>
+            </a:r>
+            <a:r>
+              <a:rPr lang="en-US" dirty="0">
+                <a:latin typeface="Calibri" charset="0"/>
+                <a:ea typeface="ＭＳ Ｐゴシック" charset="0"/>
+              </a:rPr>
+              <a:t>/Ballgown approach is also robust</a:t>
             </a:r>
           </a:p>
           <a:p>
@@ -6386,7 +7030,141 @@
 </p:sld>
 </file>
 
-<file path=ppt/slides/slide18.xml><?xml version="1.0" encoding="utf-8"?>
+<file path=ppt/slides/slide2.xml><?xml version="1.0" encoding="utf-8"?>
+<p:sld xmlns:a="http://schemas.openxmlformats.org/drawingml/2006/main" xmlns:r="http://schemas.openxmlformats.org/officeDocument/2006/relationships" xmlns:p="http://schemas.openxmlformats.org/presentationml/2006/main">
+  <p:cSld>
+    <p:spTree>
+      <p:nvGrpSpPr>
+        <p:cNvPr id="1" name=""/>
+        <p:cNvGrpSpPr/>
+        <p:nvPr/>
+      </p:nvGrpSpPr>
+      <p:grpSpPr>
+        <a:xfrm>
+          <a:off x="0" y="0"/>
+          <a:ext cx="0" cy="0"/>
+          <a:chOff x="0" y="0"/>
+          <a:chExt cx="0" cy="0"/>
+        </a:xfrm>
+      </p:grpSpPr>
+      <p:sp>
+        <p:nvSpPr>
+          <p:cNvPr id="28673" name="Title 1"/>
+          <p:cNvSpPr>
+            <a:spLocks noGrp="1"/>
+          </p:cNvSpPr>
+          <p:nvPr>
+            <p:ph type="title"/>
+          </p:nvPr>
+        </p:nvSpPr>
+        <p:spPr>
+          <a:xfrm>
+            <a:off x="1676400" y="-27384"/>
+            <a:ext cx="8839200" cy="1143000"/>
+          </a:xfrm>
+        </p:spPr>
+        <p:txBody>
+          <a:bodyPr/>
+          <a:lstStyle/>
+          <a:p>
+            <a:pPr algn="ctr"/>
+            <a:r>
+              <a:rPr lang="en-US" b="1" dirty="0">
+                <a:latin typeface="Calibri" charset="0"/>
+                <a:ea typeface="ＭＳ Ｐゴシック" charset="0"/>
+              </a:rPr>
+              <a:t>Learning Objectives of Module 3</a:t>
+            </a:r>
+          </a:p>
+        </p:txBody>
+      </p:sp>
+      <p:sp>
+        <p:nvSpPr>
+          <p:cNvPr id="28674" name="Content Placeholder 2"/>
+          <p:cNvSpPr>
+            <a:spLocks noGrp="1"/>
+          </p:cNvSpPr>
+          <p:nvPr>
+            <p:ph idx="1"/>
+          </p:nvPr>
+        </p:nvSpPr>
+        <p:spPr>
+          <a:xfrm>
+            <a:off x="740979" y="1340768"/>
+            <a:ext cx="10570780" cy="4983832"/>
+          </a:xfrm>
+        </p:spPr>
+        <p:txBody>
+          <a:bodyPr wrap="square">
+            <a:normAutofit/>
+          </a:bodyPr>
+          <a:lstStyle/>
+          <a:p>
+            <a:r>
+              <a:rPr lang="en-US" dirty="0">
+                <a:latin typeface="Calibri" charset="0"/>
+                <a:ea typeface="ＭＳ Ｐゴシック" charset="0"/>
+              </a:rPr>
+              <a:t>Review basic concepts and popular metrics of abundance estimation </a:t>
+            </a:r>
+          </a:p>
+          <a:p>
+            <a:r>
+              <a:rPr lang="en-US" dirty="0">
+                <a:latin typeface="Calibri" charset="0"/>
+                <a:ea typeface="ＭＳ Ｐゴシック" charset="0"/>
+              </a:rPr>
+              <a:t>Review </a:t>
+            </a:r>
+            <a:r>
+              <a:rPr lang="en-US" dirty="0" err="1">
+                <a:latin typeface="Calibri" charset="0"/>
+                <a:ea typeface="ＭＳ Ｐゴシック" charset="0"/>
+              </a:rPr>
+              <a:t>StringTie</a:t>
+            </a:r>
+            <a:r>
+              <a:rPr lang="en-US" dirty="0">
+                <a:latin typeface="Calibri" charset="0"/>
+                <a:ea typeface="ＭＳ Ｐゴシック" charset="0"/>
+              </a:rPr>
+              <a:t> estimation approach and options</a:t>
+            </a:r>
+          </a:p>
+          <a:p>
+            <a:r>
+              <a:rPr lang="en-US" dirty="0">
+                <a:latin typeface="Calibri" charset="0"/>
+                <a:ea typeface="ＭＳ Ｐゴシック" charset="0"/>
+              </a:rPr>
+              <a:t>Discuss raw read count approaches</a:t>
+            </a:r>
+          </a:p>
+          <a:p>
+            <a:r>
+              <a:rPr lang="en-US" dirty="0">
+                <a:latin typeface="Calibri" charset="0"/>
+                <a:ea typeface="ＭＳ Ｐゴシック" charset="0"/>
+              </a:rPr>
+              <a:t>Review differential expression analysis approaches and caveats</a:t>
+            </a:r>
+          </a:p>
+        </p:txBody>
+      </p:sp>
+    </p:spTree>
+    <p:extLst>
+      <p:ext uri="{BB962C8B-B14F-4D97-AF65-F5344CB8AC3E}">
+        <p14:creationId xmlns:p14="http://schemas.microsoft.com/office/powerpoint/2010/main" val="593339016"/>
+      </p:ext>
+    </p:extLst>
+  </p:cSld>
+  <p:clrMapOvr>
+    <a:masterClrMapping/>
+  </p:clrMapOvr>
+</p:sld>
+</file>
+
+<file path=ppt/slides/slide20.xml><?xml version="1.0" encoding="utf-8"?>
 <p:sld xmlns:a="http://schemas.openxmlformats.org/drawingml/2006/main" xmlns:r="http://schemas.openxmlformats.org/officeDocument/2006/relationships" xmlns:p="http://schemas.openxmlformats.org/presentationml/2006/main">
   <p:cSld>
     <p:spTree>
@@ -6479,7 +7257,7 @@
 </p:sld>
 </file>
 
-<file path=ppt/slides/slide19.xml><?xml version="1.0" encoding="utf-8"?>
+<file path=ppt/slides/slide21.xml><?xml version="1.0" encoding="utf-8"?>
 <p:sld xmlns:a="http://schemas.openxmlformats.org/drawingml/2006/main" xmlns:r="http://schemas.openxmlformats.org/officeDocument/2006/relationships" xmlns:p="http://schemas.openxmlformats.org/presentationml/2006/main">
   <p:cSld>
     <p:spTree>
@@ -6673,492 +7451,7 @@
 </p:sld>
 </file>
 
-<file path=ppt/slides/slide2.xml><?xml version="1.0" encoding="utf-8"?>
-<p:sld xmlns:a="http://schemas.openxmlformats.org/drawingml/2006/main" xmlns:r="http://schemas.openxmlformats.org/officeDocument/2006/relationships" xmlns:p="http://schemas.openxmlformats.org/presentationml/2006/main">
-  <p:cSld>
-    <p:spTree>
-      <p:nvGrpSpPr>
-        <p:cNvPr id="1" name=""/>
-        <p:cNvGrpSpPr/>
-        <p:nvPr/>
-      </p:nvGrpSpPr>
-      <p:grpSpPr>
-        <a:xfrm>
-          <a:off x="0" y="0"/>
-          <a:ext cx="0" cy="0"/>
-          <a:chOff x="0" y="0"/>
-          <a:chExt cx="0" cy="0"/>
-        </a:xfrm>
-      </p:grpSpPr>
-      <p:sp>
-        <p:nvSpPr>
-          <p:cNvPr id="27649" name="Title 1"/>
-          <p:cNvSpPr>
-            <a:spLocks noGrp="1"/>
-          </p:cNvSpPr>
-          <p:nvPr>
-            <p:ph type="title"/>
-          </p:nvPr>
-        </p:nvSpPr>
-        <p:spPr>
-          <a:xfrm>
-            <a:off x="0" y="10886"/>
-            <a:ext cx="12192000" cy="801914"/>
-          </a:xfrm>
-        </p:spPr>
-        <p:txBody>
-          <a:bodyPr>
-            <a:normAutofit fontScale="90000"/>
-          </a:bodyPr>
-          <a:lstStyle/>
-          <a:p>
-            <a:pPr algn="ctr"/>
-            <a:r>
-              <a:rPr lang="en-US" b="1" dirty="0">
-                <a:latin typeface="Calibri" charset="0"/>
-                <a:ea typeface="ＭＳ Ｐゴシック" charset="0"/>
-              </a:rPr>
-              <a:t>Expression estimation for known genes and transcripts</a:t>
-            </a:r>
-          </a:p>
-        </p:txBody>
-      </p:sp>
-      <p:cxnSp>
-        <p:nvCxnSpPr>
-          <p:cNvPr id="6" name="Straight Arrow Connector 5"/>
-          <p:cNvCxnSpPr/>
-          <p:nvPr/>
-        </p:nvCxnSpPr>
-        <p:spPr>
-          <a:xfrm>
-            <a:off x="9600990" y="2394925"/>
-            <a:ext cx="700955" cy="248"/>
-          </a:xfrm>
-          <a:prstGeom prst="straightConnector1">
-            <a:avLst/>
-          </a:prstGeom>
-          <a:ln w="38100" cmpd="sng">
-            <a:solidFill>
-              <a:srgbClr val="4F81BD"/>
-            </a:solidFill>
-            <a:tailEnd type="arrow"/>
-          </a:ln>
-        </p:spPr>
-        <p:style>
-          <a:lnRef idx="2">
-            <a:schemeClr val="accent1"/>
-          </a:lnRef>
-          <a:fillRef idx="0">
-            <a:schemeClr val="accent1"/>
-          </a:fillRef>
-          <a:effectRef idx="1">
-            <a:schemeClr val="accent1"/>
-          </a:effectRef>
-          <a:fontRef idx="minor">
-            <a:schemeClr val="tx1"/>
-          </a:fontRef>
-        </p:style>
-      </p:cxnSp>
-      <p:sp>
-        <p:nvSpPr>
-          <p:cNvPr id="27652" name="TextBox 6"/>
-          <p:cNvSpPr txBox="1">
-            <a:spLocks noChangeArrowheads="1"/>
-          </p:cNvSpPr>
-          <p:nvPr/>
-        </p:nvSpPr>
-        <p:spPr bwMode="auto">
-          <a:xfrm>
-            <a:off x="9456973" y="1963125"/>
-            <a:ext cx="915988" cy="400050"/>
-          </a:xfrm>
-          <a:prstGeom prst="rect">
-            <a:avLst/>
-          </a:prstGeom>
-          <a:noFill/>
-          <a:ln>
-            <a:noFill/>
-          </a:ln>
-          <a:extLst>
-            <a:ext uri="{909E8E84-426E-40dd-AFC4-6F175D3DCCD1}">
-              <a14:hiddenFill xmlns="" xmlns:a14="http://schemas.microsoft.com/office/drawing/2010/main">
-                <a:solidFill>
-                  <a:srgbClr val="FFFFFF"/>
-                </a:solidFill>
-              </a14:hiddenFill>
-            </a:ext>
-            <a:ext uri="{91240B29-F687-4f45-9708-019B960494DF}">
-              <a14:hiddenLine xmlns="" xmlns:a14="http://schemas.microsoft.com/office/drawing/2010/main" w="9525">
-                <a:solidFill>
-                  <a:srgbClr val="000000"/>
-                </a:solidFill>
-                <a:miter lim="800000"/>
-                <a:headEnd/>
-                <a:tailEnd/>
-              </a14:hiddenLine>
-            </a:ext>
-          </a:extLst>
-        </p:spPr>
-        <p:txBody>
-          <a:bodyPr wrap="none">
-            <a:spAutoFit/>
-          </a:bodyPr>
-          <a:lstStyle>
-            <a:lvl1pPr eaLnBrk="0" hangingPunct="0">
-              <a:defRPr sz="2400">
-                <a:solidFill>
-                  <a:schemeClr val="tx1"/>
-                </a:solidFill>
-                <a:latin typeface="Arial" charset="0"/>
-                <a:ea typeface="ＭＳ Ｐゴシック" charset="0"/>
-                <a:cs typeface="ＭＳ Ｐゴシック" charset="0"/>
-              </a:defRPr>
-            </a:lvl1pPr>
-            <a:lvl2pPr marL="742950" indent="-285750" eaLnBrk="0" hangingPunct="0">
-              <a:defRPr sz="2400">
-                <a:solidFill>
-                  <a:schemeClr val="tx1"/>
-                </a:solidFill>
-                <a:latin typeface="Arial" charset="0"/>
-                <a:ea typeface="ＭＳ Ｐゴシック" charset="0"/>
-              </a:defRPr>
-            </a:lvl2pPr>
-            <a:lvl3pPr marL="1143000" indent="-228600" eaLnBrk="0" hangingPunct="0">
-              <a:defRPr sz="2400">
-                <a:solidFill>
-                  <a:schemeClr val="tx1"/>
-                </a:solidFill>
-                <a:latin typeface="Arial" charset="0"/>
-                <a:ea typeface="ＭＳ Ｐゴシック" charset="0"/>
-              </a:defRPr>
-            </a:lvl3pPr>
-            <a:lvl4pPr marL="1600200" indent="-228600" eaLnBrk="0" hangingPunct="0">
-              <a:defRPr sz="2400">
-                <a:solidFill>
-                  <a:schemeClr val="tx1"/>
-                </a:solidFill>
-                <a:latin typeface="Arial" charset="0"/>
-                <a:ea typeface="ＭＳ Ｐゴシック" charset="0"/>
-              </a:defRPr>
-            </a:lvl4pPr>
-            <a:lvl5pPr marL="2057400" indent="-228600" eaLnBrk="0" hangingPunct="0">
-              <a:defRPr sz="2400">
-                <a:solidFill>
-                  <a:schemeClr val="tx1"/>
-                </a:solidFill>
-                <a:latin typeface="Arial" charset="0"/>
-                <a:ea typeface="ＭＳ Ｐゴシック" charset="0"/>
-              </a:defRPr>
-            </a:lvl5pPr>
-            <a:lvl6pPr marL="2514600" indent="-228600" eaLnBrk="0" fontAlgn="base" hangingPunct="0">
-              <a:spcBef>
-                <a:spcPct val="0"/>
-              </a:spcBef>
-              <a:spcAft>
-                <a:spcPct val="0"/>
-              </a:spcAft>
-              <a:defRPr sz="2400">
-                <a:solidFill>
-                  <a:schemeClr val="tx1"/>
-                </a:solidFill>
-                <a:latin typeface="Arial" charset="0"/>
-                <a:ea typeface="ＭＳ Ｐゴシック" charset="0"/>
-              </a:defRPr>
-            </a:lvl6pPr>
-            <a:lvl7pPr marL="2971800" indent="-228600" eaLnBrk="0" fontAlgn="base" hangingPunct="0">
-              <a:spcBef>
-                <a:spcPct val="0"/>
-              </a:spcBef>
-              <a:spcAft>
-                <a:spcPct val="0"/>
-              </a:spcAft>
-              <a:defRPr sz="2400">
-                <a:solidFill>
-                  <a:schemeClr val="tx1"/>
-                </a:solidFill>
-                <a:latin typeface="Arial" charset="0"/>
-                <a:ea typeface="ＭＳ Ｐゴシック" charset="0"/>
-              </a:defRPr>
-            </a:lvl7pPr>
-            <a:lvl8pPr marL="3429000" indent="-228600" eaLnBrk="0" fontAlgn="base" hangingPunct="0">
-              <a:spcBef>
-                <a:spcPct val="0"/>
-              </a:spcBef>
-              <a:spcAft>
-                <a:spcPct val="0"/>
-              </a:spcAft>
-              <a:defRPr sz="2400">
-                <a:solidFill>
-                  <a:schemeClr val="tx1"/>
-                </a:solidFill>
-                <a:latin typeface="Arial" charset="0"/>
-                <a:ea typeface="ＭＳ Ｐゴシック" charset="0"/>
-              </a:defRPr>
-            </a:lvl8pPr>
-            <a:lvl9pPr marL="3886200" indent="-228600" eaLnBrk="0" fontAlgn="base" hangingPunct="0">
-              <a:spcBef>
-                <a:spcPct val="0"/>
-              </a:spcBef>
-              <a:spcAft>
-                <a:spcPct val="0"/>
-              </a:spcAft>
-              <a:defRPr sz="2400">
-                <a:solidFill>
-                  <a:schemeClr val="tx1"/>
-                </a:solidFill>
-                <a:latin typeface="Arial" charset="0"/>
-                <a:ea typeface="ＭＳ Ｐゴシック" charset="0"/>
-              </a:defRPr>
-            </a:lvl9pPr>
-          </a:lstStyle>
-          <a:p>
-            <a:pPr eaLnBrk="1" hangingPunct="1"/>
-            <a:r>
-              <a:rPr lang="en-US" sz="2000"/>
-              <a:t>3’ bias</a:t>
-            </a:r>
-          </a:p>
-        </p:txBody>
-      </p:sp>
-      <p:cxnSp>
-        <p:nvCxnSpPr>
-          <p:cNvPr id="8" name="Straight Arrow Connector 7"/>
-          <p:cNvCxnSpPr/>
-          <p:nvPr/>
-        </p:nvCxnSpPr>
-        <p:spPr>
-          <a:xfrm>
-            <a:off x="9459305" y="3907342"/>
-            <a:ext cx="0" cy="647873"/>
-          </a:xfrm>
-          <a:prstGeom prst="straightConnector1">
-            <a:avLst/>
-          </a:prstGeom>
-          <a:ln w="38100" cmpd="sng">
-            <a:solidFill>
-              <a:srgbClr val="4F81BD"/>
-            </a:solidFill>
-            <a:tailEnd type="arrow"/>
-          </a:ln>
-        </p:spPr>
-        <p:style>
-          <a:lnRef idx="2">
-            <a:schemeClr val="accent1"/>
-          </a:lnRef>
-          <a:fillRef idx="0">
-            <a:schemeClr val="accent1"/>
-          </a:fillRef>
-          <a:effectRef idx="1">
-            <a:schemeClr val="accent1"/>
-          </a:effectRef>
-          <a:fontRef idx="minor">
-            <a:schemeClr val="tx1"/>
-          </a:fontRef>
-        </p:style>
-      </p:cxnSp>
-      <p:sp>
-        <p:nvSpPr>
-          <p:cNvPr id="27654" name="TextBox 9"/>
-          <p:cNvSpPr txBox="1">
-            <a:spLocks noChangeArrowheads="1"/>
-          </p:cNvSpPr>
-          <p:nvPr/>
-        </p:nvSpPr>
-        <p:spPr bwMode="auto">
-          <a:xfrm>
-            <a:off x="9384693" y="3907342"/>
-            <a:ext cx="1331913" cy="646113"/>
-          </a:xfrm>
-          <a:prstGeom prst="rect">
-            <a:avLst/>
-          </a:prstGeom>
-          <a:noFill/>
-          <a:ln>
-            <a:noFill/>
-          </a:ln>
-          <a:extLst>
-            <a:ext uri="{909E8E84-426E-40dd-AFC4-6F175D3DCCD1}">
-              <a14:hiddenFill xmlns="" xmlns:a14="http://schemas.microsoft.com/office/drawing/2010/main">
-                <a:solidFill>
-                  <a:srgbClr val="FFFFFF"/>
-                </a:solidFill>
-              </a14:hiddenFill>
-            </a:ext>
-            <a:ext uri="{91240B29-F687-4f45-9708-019B960494DF}">
-              <a14:hiddenLine xmlns="" xmlns:a14="http://schemas.microsoft.com/office/drawing/2010/main" w="9525">
-                <a:solidFill>
-                  <a:srgbClr val="000000"/>
-                </a:solidFill>
-                <a:miter lim="800000"/>
-                <a:headEnd/>
-                <a:tailEnd/>
-              </a14:hiddenLine>
-            </a:ext>
-          </a:extLst>
-        </p:spPr>
-        <p:txBody>
-          <a:bodyPr>
-            <a:spAutoFit/>
-          </a:bodyPr>
-          <a:lstStyle>
-            <a:lvl1pPr eaLnBrk="0" hangingPunct="0">
-              <a:defRPr sz="2400">
-                <a:solidFill>
-                  <a:schemeClr val="tx1"/>
-                </a:solidFill>
-                <a:latin typeface="Arial" charset="0"/>
-                <a:ea typeface="ＭＳ Ｐゴシック" charset="0"/>
-                <a:cs typeface="ＭＳ Ｐゴシック" charset="0"/>
-              </a:defRPr>
-            </a:lvl1pPr>
-            <a:lvl2pPr marL="742950" indent="-285750" eaLnBrk="0" hangingPunct="0">
-              <a:defRPr sz="2400">
-                <a:solidFill>
-                  <a:schemeClr val="tx1"/>
-                </a:solidFill>
-                <a:latin typeface="Arial" charset="0"/>
-                <a:ea typeface="ＭＳ Ｐゴシック" charset="0"/>
-              </a:defRPr>
-            </a:lvl2pPr>
-            <a:lvl3pPr marL="1143000" indent="-228600" eaLnBrk="0" hangingPunct="0">
-              <a:defRPr sz="2400">
-                <a:solidFill>
-                  <a:schemeClr val="tx1"/>
-                </a:solidFill>
-                <a:latin typeface="Arial" charset="0"/>
-                <a:ea typeface="ＭＳ Ｐゴシック" charset="0"/>
-              </a:defRPr>
-            </a:lvl3pPr>
-            <a:lvl4pPr marL="1600200" indent="-228600" eaLnBrk="0" hangingPunct="0">
-              <a:defRPr sz="2400">
-                <a:solidFill>
-                  <a:schemeClr val="tx1"/>
-                </a:solidFill>
-                <a:latin typeface="Arial" charset="0"/>
-                <a:ea typeface="ＭＳ Ｐゴシック" charset="0"/>
-              </a:defRPr>
-            </a:lvl4pPr>
-            <a:lvl5pPr marL="2057400" indent="-228600" eaLnBrk="0" hangingPunct="0">
-              <a:defRPr sz="2400">
-                <a:solidFill>
-                  <a:schemeClr val="tx1"/>
-                </a:solidFill>
-                <a:latin typeface="Arial" charset="0"/>
-                <a:ea typeface="ＭＳ Ｐゴシック" charset="0"/>
-              </a:defRPr>
-            </a:lvl5pPr>
-            <a:lvl6pPr marL="2514600" indent="-228600" eaLnBrk="0" fontAlgn="base" hangingPunct="0">
-              <a:spcBef>
-                <a:spcPct val="0"/>
-              </a:spcBef>
-              <a:spcAft>
-                <a:spcPct val="0"/>
-              </a:spcAft>
-              <a:defRPr sz="2400">
-                <a:solidFill>
-                  <a:schemeClr val="tx1"/>
-                </a:solidFill>
-                <a:latin typeface="Arial" charset="0"/>
-                <a:ea typeface="ＭＳ Ｐゴシック" charset="0"/>
-              </a:defRPr>
-            </a:lvl6pPr>
-            <a:lvl7pPr marL="2971800" indent="-228600" eaLnBrk="0" fontAlgn="base" hangingPunct="0">
-              <a:spcBef>
-                <a:spcPct val="0"/>
-              </a:spcBef>
-              <a:spcAft>
-                <a:spcPct val="0"/>
-              </a:spcAft>
-              <a:defRPr sz="2400">
-                <a:solidFill>
-                  <a:schemeClr val="tx1"/>
-                </a:solidFill>
-                <a:latin typeface="Arial" charset="0"/>
-                <a:ea typeface="ＭＳ Ｐゴシック" charset="0"/>
-              </a:defRPr>
-            </a:lvl7pPr>
-            <a:lvl8pPr marL="3429000" indent="-228600" eaLnBrk="0" fontAlgn="base" hangingPunct="0">
-              <a:spcBef>
-                <a:spcPct val="0"/>
-              </a:spcBef>
-              <a:spcAft>
-                <a:spcPct val="0"/>
-              </a:spcAft>
-              <a:defRPr sz="2400">
-                <a:solidFill>
-                  <a:schemeClr val="tx1"/>
-                </a:solidFill>
-                <a:latin typeface="Arial" charset="0"/>
-                <a:ea typeface="ＭＳ Ｐゴシック" charset="0"/>
-              </a:defRPr>
-            </a:lvl8pPr>
-            <a:lvl9pPr marL="3886200" indent="-228600" eaLnBrk="0" fontAlgn="base" hangingPunct="0">
-              <a:spcBef>
-                <a:spcPct val="0"/>
-              </a:spcBef>
-              <a:spcAft>
-                <a:spcPct val="0"/>
-              </a:spcAft>
-              <a:defRPr sz="2400">
-                <a:solidFill>
-                  <a:schemeClr val="tx1"/>
-                </a:solidFill>
-                <a:latin typeface="Arial" charset="0"/>
-                <a:ea typeface="ＭＳ Ｐゴシック" charset="0"/>
-              </a:defRPr>
-            </a:lvl9pPr>
-          </a:lstStyle>
-          <a:p>
-            <a:pPr algn="ctr" eaLnBrk="1" hangingPunct="1"/>
-            <a:r>
-              <a:rPr lang="en-US" sz="1800" dirty="0"/>
-              <a:t>Down-regulated</a:t>
-            </a:r>
-          </a:p>
-        </p:txBody>
-      </p:sp>
-      <p:pic>
-        <p:nvPicPr>
-          <p:cNvPr id="3" name="Content Placeholder 2" descr="Screen Shot 2013-05-30 at 8.54.37 PM.png"/>
-          <p:cNvPicPr>
-            <a:picLocks noGrp="1" noChangeAspect="1"/>
-          </p:cNvPicPr>
-          <p:nvPr>
-            <p:ph idx="1"/>
-          </p:nvPr>
-        </p:nvPicPr>
-        <p:blipFill rotWithShape="1">
-          <a:blip r:embed="rId2">
-            <a:extLst>
-              <a:ext uri="{28A0092B-C50C-407E-A947-70E740481C1C}">
-                <a14:useLocalDpi xmlns:a14="http://schemas.microsoft.com/office/drawing/2010/main" val="0"/>
-              </a:ext>
-            </a:extLst>
-          </a:blip>
-          <a:srcRect l="-575" r="-700"/>
-          <a:stretch/>
-        </p:blipFill>
-        <p:spPr>
-          <a:xfrm>
-            <a:off x="1631951" y="705927"/>
-            <a:ext cx="7739111" cy="5618673"/>
-          </a:xfrm>
-        </p:spPr>
-      </p:pic>
-    </p:spTree>
-    <p:extLst>
-      <p:ext uri="{BB962C8B-B14F-4D97-AF65-F5344CB8AC3E}">
-        <p14:creationId xmlns:p14="http://schemas.microsoft.com/office/powerpoint/2010/main" val="1369031909"/>
-      </p:ext>
-    </p:extLst>
-  </p:cSld>
-  <p:clrMapOvr>
-    <a:masterClrMapping/>
-  </p:clrMapOvr>
-</p:sld>
-</file>
-
-<file path=ppt/slides/slide20.xml><?xml version="1.0" encoding="utf-8"?>
+<file path=ppt/slides/slide22.xml><?xml version="1.0" encoding="utf-8"?>
 <p:sld xmlns:a="http://schemas.openxmlformats.org/drawingml/2006/main" xmlns:r="http://schemas.openxmlformats.org/officeDocument/2006/relationships" xmlns:p="http://schemas.openxmlformats.org/presentationml/2006/main">
   <p:cSld>
     <p:spTree>
@@ -7420,7 +7713,7 @@
 </p:sld>
 </file>
 
-<file path=ppt/slides/slide21.xml><?xml version="1.0" encoding="utf-8"?>
+<file path=ppt/slides/slide23.xml><?xml version="1.0" encoding="utf-8"?>
 <p:sld xmlns:a="http://schemas.openxmlformats.org/drawingml/2006/main" xmlns:r="http://schemas.openxmlformats.org/officeDocument/2006/relationships" xmlns:p="http://schemas.openxmlformats.org/presentationml/2006/main">
   <p:cSld>
     <p:spTree>
@@ -8049,7 +8342,7 @@
 </p:sld>
 </file>
 
-<file path=ppt/slides/slide22.xml><?xml version="1.0" encoding="utf-8"?>
+<file path=ppt/slides/slide24.xml><?xml version="1.0" encoding="utf-8"?>
 <p:sld xmlns:a="http://schemas.openxmlformats.org/drawingml/2006/main" xmlns:r="http://schemas.openxmlformats.org/officeDocument/2006/relationships" xmlns:p="http://schemas.openxmlformats.org/presentationml/2006/main">
   <p:cSld>
     <p:spTree>
@@ -11728,7 +12021,7 @@
 </p:sld>
 </file>
 
-<file path=ppt/slides/slide23.xml><?xml version="1.0" encoding="utf-8"?>
+<file path=ppt/slides/slide25.xml><?xml version="1.0" encoding="utf-8"?>
 <p:sld xmlns:a="http://schemas.openxmlformats.org/drawingml/2006/main" xmlns:r="http://schemas.openxmlformats.org/officeDocument/2006/relationships" xmlns:p="http://schemas.openxmlformats.org/presentationml/2006/main">
   <p:cSld>
     <p:spTree>
@@ -11831,6 +12124,669 @@
       </p:grpSpPr>
       <p:sp>
         <p:nvSpPr>
+          <p:cNvPr id="27649" name="Title 1"/>
+          <p:cNvSpPr>
+            <a:spLocks noGrp="1"/>
+          </p:cNvSpPr>
+          <p:nvPr>
+            <p:ph type="title"/>
+          </p:nvPr>
+        </p:nvSpPr>
+        <p:spPr>
+          <a:xfrm>
+            <a:off x="0" y="10886"/>
+            <a:ext cx="12192000" cy="801914"/>
+          </a:xfrm>
+        </p:spPr>
+        <p:txBody>
+          <a:bodyPr>
+            <a:normAutofit fontScale="90000"/>
+          </a:bodyPr>
+          <a:lstStyle/>
+          <a:p>
+            <a:pPr algn="ctr"/>
+            <a:r>
+              <a:rPr lang="en-US" b="1" dirty="0">
+                <a:latin typeface="Calibri" charset="0"/>
+                <a:ea typeface="ＭＳ Ｐゴシック" charset="0"/>
+              </a:rPr>
+              <a:t>Expression estimation for known genes and transcripts</a:t>
+            </a:r>
+          </a:p>
+        </p:txBody>
+      </p:sp>
+      <p:cxnSp>
+        <p:nvCxnSpPr>
+          <p:cNvPr id="6" name="Straight Arrow Connector 5"/>
+          <p:cNvCxnSpPr/>
+          <p:nvPr/>
+        </p:nvCxnSpPr>
+        <p:spPr>
+          <a:xfrm>
+            <a:off x="9600990" y="2394925"/>
+            <a:ext cx="700955" cy="248"/>
+          </a:xfrm>
+          <a:prstGeom prst="straightConnector1">
+            <a:avLst/>
+          </a:prstGeom>
+          <a:ln w="38100" cmpd="sng">
+            <a:solidFill>
+              <a:srgbClr val="4F81BD"/>
+            </a:solidFill>
+            <a:tailEnd type="arrow"/>
+          </a:ln>
+        </p:spPr>
+        <p:style>
+          <a:lnRef idx="2">
+            <a:schemeClr val="accent1"/>
+          </a:lnRef>
+          <a:fillRef idx="0">
+            <a:schemeClr val="accent1"/>
+          </a:fillRef>
+          <a:effectRef idx="1">
+            <a:schemeClr val="accent1"/>
+          </a:effectRef>
+          <a:fontRef idx="minor">
+            <a:schemeClr val="tx1"/>
+          </a:fontRef>
+        </p:style>
+      </p:cxnSp>
+      <p:sp>
+        <p:nvSpPr>
+          <p:cNvPr id="27652" name="TextBox 6"/>
+          <p:cNvSpPr txBox="1">
+            <a:spLocks noChangeArrowheads="1"/>
+          </p:cNvSpPr>
+          <p:nvPr/>
+        </p:nvSpPr>
+        <p:spPr bwMode="auto">
+          <a:xfrm>
+            <a:off x="9456973" y="1963125"/>
+            <a:ext cx="915988" cy="400050"/>
+          </a:xfrm>
+          <a:prstGeom prst="rect">
+            <a:avLst/>
+          </a:prstGeom>
+          <a:noFill/>
+          <a:ln>
+            <a:noFill/>
+          </a:ln>
+          <a:extLst>
+            <a:ext uri="{909E8E84-426E-40dd-AFC4-6F175D3DCCD1}">
+              <a14:hiddenFill xmlns="" xmlns:a14="http://schemas.microsoft.com/office/drawing/2010/main">
+                <a:solidFill>
+                  <a:srgbClr val="FFFFFF"/>
+                </a:solidFill>
+              </a14:hiddenFill>
+            </a:ext>
+            <a:ext uri="{91240B29-F687-4f45-9708-019B960494DF}">
+              <a14:hiddenLine xmlns="" xmlns:a14="http://schemas.microsoft.com/office/drawing/2010/main" w="9525">
+                <a:solidFill>
+                  <a:srgbClr val="000000"/>
+                </a:solidFill>
+                <a:miter lim="800000"/>
+                <a:headEnd/>
+                <a:tailEnd/>
+              </a14:hiddenLine>
+            </a:ext>
+          </a:extLst>
+        </p:spPr>
+        <p:txBody>
+          <a:bodyPr wrap="none">
+            <a:spAutoFit/>
+          </a:bodyPr>
+          <a:lstStyle>
+            <a:lvl1pPr eaLnBrk="0" hangingPunct="0">
+              <a:defRPr sz="2400">
+                <a:solidFill>
+                  <a:schemeClr val="tx1"/>
+                </a:solidFill>
+                <a:latin typeface="Arial" charset="0"/>
+                <a:ea typeface="ＭＳ Ｐゴシック" charset="0"/>
+                <a:cs typeface="ＭＳ Ｐゴシック" charset="0"/>
+              </a:defRPr>
+            </a:lvl1pPr>
+            <a:lvl2pPr marL="742950" indent="-285750" eaLnBrk="0" hangingPunct="0">
+              <a:defRPr sz="2400">
+                <a:solidFill>
+                  <a:schemeClr val="tx1"/>
+                </a:solidFill>
+                <a:latin typeface="Arial" charset="0"/>
+                <a:ea typeface="ＭＳ Ｐゴシック" charset="0"/>
+              </a:defRPr>
+            </a:lvl2pPr>
+            <a:lvl3pPr marL="1143000" indent="-228600" eaLnBrk="0" hangingPunct="0">
+              <a:defRPr sz="2400">
+                <a:solidFill>
+                  <a:schemeClr val="tx1"/>
+                </a:solidFill>
+                <a:latin typeface="Arial" charset="0"/>
+                <a:ea typeface="ＭＳ Ｐゴシック" charset="0"/>
+              </a:defRPr>
+            </a:lvl3pPr>
+            <a:lvl4pPr marL="1600200" indent="-228600" eaLnBrk="0" hangingPunct="0">
+              <a:defRPr sz="2400">
+                <a:solidFill>
+                  <a:schemeClr val="tx1"/>
+                </a:solidFill>
+                <a:latin typeface="Arial" charset="0"/>
+                <a:ea typeface="ＭＳ Ｐゴシック" charset="0"/>
+              </a:defRPr>
+            </a:lvl4pPr>
+            <a:lvl5pPr marL="2057400" indent="-228600" eaLnBrk="0" hangingPunct="0">
+              <a:defRPr sz="2400">
+                <a:solidFill>
+                  <a:schemeClr val="tx1"/>
+                </a:solidFill>
+                <a:latin typeface="Arial" charset="0"/>
+                <a:ea typeface="ＭＳ Ｐゴシック" charset="0"/>
+              </a:defRPr>
+            </a:lvl5pPr>
+            <a:lvl6pPr marL="2514600" indent="-228600" eaLnBrk="0" fontAlgn="base" hangingPunct="0">
+              <a:spcBef>
+                <a:spcPct val="0"/>
+              </a:spcBef>
+              <a:spcAft>
+                <a:spcPct val="0"/>
+              </a:spcAft>
+              <a:defRPr sz="2400">
+                <a:solidFill>
+                  <a:schemeClr val="tx1"/>
+                </a:solidFill>
+                <a:latin typeface="Arial" charset="0"/>
+                <a:ea typeface="ＭＳ Ｐゴシック" charset="0"/>
+              </a:defRPr>
+            </a:lvl6pPr>
+            <a:lvl7pPr marL="2971800" indent="-228600" eaLnBrk="0" fontAlgn="base" hangingPunct="0">
+              <a:spcBef>
+                <a:spcPct val="0"/>
+              </a:spcBef>
+              <a:spcAft>
+                <a:spcPct val="0"/>
+              </a:spcAft>
+              <a:defRPr sz="2400">
+                <a:solidFill>
+                  <a:schemeClr val="tx1"/>
+                </a:solidFill>
+                <a:latin typeface="Arial" charset="0"/>
+                <a:ea typeface="ＭＳ Ｐゴシック" charset="0"/>
+              </a:defRPr>
+            </a:lvl7pPr>
+            <a:lvl8pPr marL="3429000" indent="-228600" eaLnBrk="0" fontAlgn="base" hangingPunct="0">
+              <a:spcBef>
+                <a:spcPct val="0"/>
+              </a:spcBef>
+              <a:spcAft>
+                <a:spcPct val="0"/>
+              </a:spcAft>
+              <a:defRPr sz="2400">
+                <a:solidFill>
+                  <a:schemeClr val="tx1"/>
+                </a:solidFill>
+                <a:latin typeface="Arial" charset="0"/>
+                <a:ea typeface="ＭＳ Ｐゴシック" charset="0"/>
+              </a:defRPr>
+            </a:lvl8pPr>
+            <a:lvl9pPr marL="3886200" indent="-228600" eaLnBrk="0" fontAlgn="base" hangingPunct="0">
+              <a:spcBef>
+                <a:spcPct val="0"/>
+              </a:spcBef>
+              <a:spcAft>
+                <a:spcPct val="0"/>
+              </a:spcAft>
+              <a:defRPr sz="2400">
+                <a:solidFill>
+                  <a:schemeClr val="tx1"/>
+                </a:solidFill>
+                <a:latin typeface="Arial" charset="0"/>
+                <a:ea typeface="ＭＳ Ｐゴシック" charset="0"/>
+              </a:defRPr>
+            </a:lvl9pPr>
+          </a:lstStyle>
+          <a:p>
+            <a:pPr eaLnBrk="1" hangingPunct="1"/>
+            <a:r>
+              <a:rPr lang="en-US" sz="2000" dirty="0"/>
+              <a:t>3’ bias</a:t>
+            </a:r>
+          </a:p>
+        </p:txBody>
+      </p:sp>
+      <p:cxnSp>
+        <p:nvCxnSpPr>
+          <p:cNvPr id="8" name="Straight Arrow Connector 7"/>
+          <p:cNvCxnSpPr/>
+          <p:nvPr/>
+        </p:nvCxnSpPr>
+        <p:spPr>
+          <a:xfrm>
+            <a:off x="9459305" y="3907342"/>
+            <a:ext cx="0" cy="647873"/>
+          </a:xfrm>
+          <a:prstGeom prst="straightConnector1">
+            <a:avLst/>
+          </a:prstGeom>
+          <a:ln w="38100" cmpd="sng">
+            <a:solidFill>
+              <a:srgbClr val="4F81BD"/>
+            </a:solidFill>
+            <a:tailEnd type="arrow"/>
+          </a:ln>
+        </p:spPr>
+        <p:style>
+          <a:lnRef idx="2">
+            <a:schemeClr val="accent1"/>
+          </a:lnRef>
+          <a:fillRef idx="0">
+            <a:schemeClr val="accent1"/>
+          </a:fillRef>
+          <a:effectRef idx="1">
+            <a:schemeClr val="accent1"/>
+          </a:effectRef>
+          <a:fontRef idx="minor">
+            <a:schemeClr val="tx1"/>
+          </a:fontRef>
+        </p:style>
+      </p:cxnSp>
+      <p:sp>
+        <p:nvSpPr>
+          <p:cNvPr id="27654" name="TextBox 9"/>
+          <p:cNvSpPr txBox="1">
+            <a:spLocks noChangeArrowheads="1"/>
+          </p:cNvSpPr>
+          <p:nvPr/>
+        </p:nvSpPr>
+        <p:spPr bwMode="auto">
+          <a:xfrm>
+            <a:off x="9384693" y="3907342"/>
+            <a:ext cx="1331913" cy="646113"/>
+          </a:xfrm>
+          <a:prstGeom prst="rect">
+            <a:avLst/>
+          </a:prstGeom>
+          <a:noFill/>
+          <a:ln>
+            <a:noFill/>
+          </a:ln>
+          <a:extLst>
+            <a:ext uri="{909E8E84-426E-40dd-AFC4-6F175D3DCCD1}">
+              <a14:hiddenFill xmlns="" xmlns:a14="http://schemas.microsoft.com/office/drawing/2010/main">
+                <a:solidFill>
+                  <a:srgbClr val="FFFFFF"/>
+                </a:solidFill>
+              </a14:hiddenFill>
+            </a:ext>
+            <a:ext uri="{91240B29-F687-4f45-9708-019B960494DF}">
+              <a14:hiddenLine xmlns="" xmlns:a14="http://schemas.microsoft.com/office/drawing/2010/main" w="9525">
+                <a:solidFill>
+                  <a:srgbClr val="000000"/>
+                </a:solidFill>
+                <a:miter lim="800000"/>
+                <a:headEnd/>
+                <a:tailEnd/>
+              </a14:hiddenLine>
+            </a:ext>
+          </a:extLst>
+        </p:spPr>
+        <p:txBody>
+          <a:bodyPr>
+            <a:spAutoFit/>
+          </a:bodyPr>
+          <a:lstStyle>
+            <a:lvl1pPr eaLnBrk="0" hangingPunct="0">
+              <a:defRPr sz="2400">
+                <a:solidFill>
+                  <a:schemeClr val="tx1"/>
+                </a:solidFill>
+                <a:latin typeface="Arial" charset="0"/>
+                <a:ea typeface="ＭＳ Ｐゴシック" charset="0"/>
+                <a:cs typeface="ＭＳ Ｐゴシック" charset="0"/>
+              </a:defRPr>
+            </a:lvl1pPr>
+            <a:lvl2pPr marL="742950" indent="-285750" eaLnBrk="0" hangingPunct="0">
+              <a:defRPr sz="2400">
+                <a:solidFill>
+                  <a:schemeClr val="tx1"/>
+                </a:solidFill>
+                <a:latin typeface="Arial" charset="0"/>
+                <a:ea typeface="ＭＳ Ｐゴシック" charset="0"/>
+              </a:defRPr>
+            </a:lvl2pPr>
+            <a:lvl3pPr marL="1143000" indent="-228600" eaLnBrk="0" hangingPunct="0">
+              <a:defRPr sz="2400">
+                <a:solidFill>
+                  <a:schemeClr val="tx1"/>
+                </a:solidFill>
+                <a:latin typeface="Arial" charset="0"/>
+                <a:ea typeface="ＭＳ Ｐゴシック" charset="0"/>
+              </a:defRPr>
+            </a:lvl3pPr>
+            <a:lvl4pPr marL="1600200" indent="-228600" eaLnBrk="0" hangingPunct="0">
+              <a:defRPr sz="2400">
+                <a:solidFill>
+                  <a:schemeClr val="tx1"/>
+                </a:solidFill>
+                <a:latin typeface="Arial" charset="0"/>
+                <a:ea typeface="ＭＳ Ｐゴシック" charset="0"/>
+              </a:defRPr>
+            </a:lvl4pPr>
+            <a:lvl5pPr marL="2057400" indent="-228600" eaLnBrk="0" hangingPunct="0">
+              <a:defRPr sz="2400">
+                <a:solidFill>
+                  <a:schemeClr val="tx1"/>
+                </a:solidFill>
+                <a:latin typeface="Arial" charset="0"/>
+                <a:ea typeface="ＭＳ Ｐゴシック" charset="0"/>
+              </a:defRPr>
+            </a:lvl5pPr>
+            <a:lvl6pPr marL="2514600" indent="-228600" eaLnBrk="0" fontAlgn="base" hangingPunct="0">
+              <a:spcBef>
+                <a:spcPct val="0"/>
+              </a:spcBef>
+              <a:spcAft>
+                <a:spcPct val="0"/>
+              </a:spcAft>
+              <a:defRPr sz="2400">
+                <a:solidFill>
+                  <a:schemeClr val="tx1"/>
+                </a:solidFill>
+                <a:latin typeface="Arial" charset="0"/>
+                <a:ea typeface="ＭＳ Ｐゴシック" charset="0"/>
+              </a:defRPr>
+            </a:lvl6pPr>
+            <a:lvl7pPr marL="2971800" indent="-228600" eaLnBrk="0" fontAlgn="base" hangingPunct="0">
+              <a:spcBef>
+                <a:spcPct val="0"/>
+              </a:spcBef>
+              <a:spcAft>
+                <a:spcPct val="0"/>
+              </a:spcAft>
+              <a:defRPr sz="2400">
+                <a:solidFill>
+                  <a:schemeClr val="tx1"/>
+                </a:solidFill>
+                <a:latin typeface="Arial" charset="0"/>
+                <a:ea typeface="ＭＳ Ｐゴシック" charset="0"/>
+              </a:defRPr>
+            </a:lvl7pPr>
+            <a:lvl8pPr marL="3429000" indent="-228600" eaLnBrk="0" fontAlgn="base" hangingPunct="0">
+              <a:spcBef>
+                <a:spcPct val="0"/>
+              </a:spcBef>
+              <a:spcAft>
+                <a:spcPct val="0"/>
+              </a:spcAft>
+              <a:defRPr sz="2400">
+                <a:solidFill>
+                  <a:schemeClr val="tx1"/>
+                </a:solidFill>
+                <a:latin typeface="Arial" charset="0"/>
+                <a:ea typeface="ＭＳ Ｐゴシック" charset="0"/>
+              </a:defRPr>
+            </a:lvl8pPr>
+            <a:lvl9pPr marL="3886200" indent="-228600" eaLnBrk="0" fontAlgn="base" hangingPunct="0">
+              <a:spcBef>
+                <a:spcPct val="0"/>
+              </a:spcBef>
+              <a:spcAft>
+                <a:spcPct val="0"/>
+              </a:spcAft>
+              <a:defRPr sz="2400">
+                <a:solidFill>
+                  <a:schemeClr val="tx1"/>
+                </a:solidFill>
+                <a:latin typeface="Arial" charset="0"/>
+                <a:ea typeface="ＭＳ Ｐゴシック" charset="0"/>
+              </a:defRPr>
+            </a:lvl9pPr>
+          </a:lstStyle>
+          <a:p>
+            <a:pPr algn="ctr" eaLnBrk="1" hangingPunct="1"/>
+            <a:r>
+              <a:rPr lang="en-US" sz="1800" dirty="0"/>
+              <a:t>Down-regulated</a:t>
+            </a:r>
+          </a:p>
+        </p:txBody>
+      </p:sp>
+      <p:pic>
+        <p:nvPicPr>
+          <p:cNvPr id="3" name="Content Placeholder 2" descr="Screen Shot 2013-05-30 at 8.54.37 PM.png"/>
+          <p:cNvPicPr>
+            <a:picLocks noGrp="1" noChangeAspect="1"/>
+          </p:cNvPicPr>
+          <p:nvPr>
+            <p:ph idx="1"/>
+          </p:nvPr>
+        </p:nvPicPr>
+        <p:blipFill rotWithShape="1">
+          <a:blip r:embed="rId2">
+            <a:extLst>
+              <a:ext uri="{28A0092B-C50C-407E-A947-70E740481C1C}">
+                <a14:useLocalDpi xmlns:a14="http://schemas.microsoft.com/office/drawing/2010/main" val="0"/>
+              </a:ext>
+            </a:extLst>
+          </a:blip>
+          <a:srcRect l="-575" r="-700"/>
+          <a:stretch/>
+        </p:blipFill>
+        <p:spPr>
+          <a:xfrm>
+            <a:off x="1631951" y="705927"/>
+            <a:ext cx="7739111" cy="5618673"/>
+          </a:xfrm>
+        </p:spPr>
+      </p:pic>
+    </p:spTree>
+    <p:extLst>
+      <p:ext uri="{BB962C8B-B14F-4D97-AF65-F5344CB8AC3E}">
+        <p14:creationId xmlns:p14="http://schemas.microsoft.com/office/powerpoint/2010/main" val="1369031909"/>
+      </p:ext>
+    </p:extLst>
+  </p:cSld>
+  <p:clrMapOvr>
+    <a:masterClrMapping/>
+  </p:clrMapOvr>
+  <p:timing>
+    <p:tnLst>
+      <p:par>
+        <p:cTn id="1" dur="indefinite" restart="never" nodeType="tmRoot">
+          <p:childTnLst>
+            <p:seq concurrent="1" nextAc="seek">
+              <p:cTn id="2" dur="indefinite" nodeType="mainSeq">
+                <p:childTnLst>
+                  <p:par>
+                    <p:cTn id="3" fill="hold">
+                      <p:stCondLst>
+                        <p:cond delay="indefinite"/>
+                      </p:stCondLst>
+                      <p:childTnLst>
+                        <p:par>
+                          <p:cTn id="4" fill="hold">
+                            <p:stCondLst>
+                              <p:cond delay="0"/>
+                            </p:stCondLst>
+                            <p:childTnLst>
+                              <p:par>
+                                <p:cTn id="5" presetID="1" presetClass="entr" presetSubtype="0" fill="hold" nodeType="clickEffect">
+                                  <p:stCondLst>
+                                    <p:cond delay="0"/>
+                                  </p:stCondLst>
+                                  <p:childTnLst>
+                                    <p:set>
+                                      <p:cBhvr>
+                                        <p:cTn id="6" dur="1" fill="hold">
+                                          <p:stCondLst>
+                                            <p:cond delay="0"/>
+                                          </p:stCondLst>
+                                        </p:cTn>
+                                        <p:tgtEl>
+                                          <p:spTgt spid="6"/>
+                                        </p:tgtEl>
+                                        <p:attrNameLst>
+                                          <p:attrName>style.visibility</p:attrName>
+                                        </p:attrNameLst>
+                                      </p:cBhvr>
+                                      <p:to>
+                                        <p:strVal val="visible"/>
+                                      </p:to>
+                                    </p:set>
+                                  </p:childTnLst>
+                                </p:cTn>
+                              </p:par>
+                              <p:par>
+                                <p:cTn id="7" presetID="1" presetClass="entr" presetSubtype="0" fill="hold" grpId="0" nodeType="withEffect">
+                                  <p:stCondLst>
+                                    <p:cond delay="0"/>
+                                  </p:stCondLst>
+                                  <p:childTnLst>
+                                    <p:set>
+                                      <p:cBhvr>
+                                        <p:cTn id="8" dur="1" fill="hold">
+                                          <p:stCondLst>
+                                            <p:cond delay="0"/>
+                                          </p:stCondLst>
+                                        </p:cTn>
+                                        <p:tgtEl>
+                                          <p:spTgt spid="27652"/>
+                                        </p:tgtEl>
+                                        <p:attrNameLst>
+                                          <p:attrName>style.visibility</p:attrName>
+                                        </p:attrNameLst>
+                                      </p:cBhvr>
+                                      <p:to>
+                                        <p:strVal val="visible"/>
+                                      </p:to>
+                                    </p:set>
+                                  </p:childTnLst>
+                                </p:cTn>
+                              </p:par>
+                            </p:childTnLst>
+                          </p:cTn>
+                        </p:par>
+                      </p:childTnLst>
+                    </p:cTn>
+                  </p:par>
+                  <p:par>
+                    <p:cTn id="9" fill="hold">
+                      <p:stCondLst>
+                        <p:cond delay="indefinite"/>
+                      </p:stCondLst>
+                      <p:childTnLst>
+                        <p:par>
+                          <p:cTn id="10" fill="hold">
+                            <p:stCondLst>
+                              <p:cond delay="0"/>
+                            </p:stCondLst>
+                            <p:childTnLst>
+                              <p:par>
+                                <p:cTn id="11" presetID="1" presetClass="entr" presetSubtype="0" fill="hold" nodeType="clickEffect">
+                                  <p:stCondLst>
+                                    <p:cond delay="0"/>
+                                  </p:stCondLst>
+                                  <p:childTnLst>
+                                    <p:set>
+                                      <p:cBhvr>
+                                        <p:cTn id="12" dur="1" fill="hold">
+                                          <p:stCondLst>
+                                            <p:cond delay="0"/>
+                                          </p:stCondLst>
+                                        </p:cTn>
+                                        <p:tgtEl>
+                                          <p:spTgt spid="8"/>
+                                        </p:tgtEl>
+                                        <p:attrNameLst>
+                                          <p:attrName>style.visibility</p:attrName>
+                                        </p:attrNameLst>
+                                      </p:cBhvr>
+                                      <p:to>
+                                        <p:strVal val="visible"/>
+                                      </p:to>
+                                    </p:set>
+                                  </p:childTnLst>
+                                </p:cTn>
+                              </p:par>
+                              <p:par>
+                                <p:cTn id="13" presetID="1" presetClass="entr" presetSubtype="0" fill="hold" grpId="0" nodeType="withEffect">
+                                  <p:stCondLst>
+                                    <p:cond delay="0"/>
+                                  </p:stCondLst>
+                                  <p:childTnLst>
+                                    <p:set>
+                                      <p:cBhvr>
+                                        <p:cTn id="14" dur="1" fill="hold">
+                                          <p:stCondLst>
+                                            <p:cond delay="0"/>
+                                          </p:stCondLst>
+                                        </p:cTn>
+                                        <p:tgtEl>
+                                          <p:spTgt spid="27654"/>
+                                        </p:tgtEl>
+                                        <p:attrNameLst>
+                                          <p:attrName>style.visibility</p:attrName>
+                                        </p:attrNameLst>
+                                      </p:cBhvr>
+                                      <p:to>
+                                        <p:strVal val="visible"/>
+                                      </p:to>
+                                    </p:set>
+                                  </p:childTnLst>
+                                </p:cTn>
+                              </p:par>
+                            </p:childTnLst>
+                          </p:cTn>
+                        </p:par>
+                      </p:childTnLst>
+                    </p:cTn>
+                  </p:par>
+                </p:childTnLst>
+              </p:cTn>
+              <p:prevCondLst>
+                <p:cond evt="onPrev" delay="0">
+                  <p:tgtEl>
+                    <p:sldTgt/>
+                  </p:tgtEl>
+                </p:cond>
+              </p:prevCondLst>
+              <p:nextCondLst>
+                <p:cond evt="onNext" delay="0">
+                  <p:tgtEl>
+                    <p:sldTgt/>
+                  </p:tgtEl>
+                </p:cond>
+              </p:nextCondLst>
+            </p:seq>
+          </p:childTnLst>
+        </p:cTn>
+      </p:par>
+    </p:tnLst>
+    <p:bldLst>
+      <p:bldP spid="27652" grpId="0"/>
+      <p:bldP spid="27654" grpId="0"/>
+    </p:bldLst>
+  </p:timing>
+</p:sld>
+</file>
+
+<file path=ppt/slides/slide4.xml><?xml version="1.0" encoding="utf-8"?>
+<p:sld xmlns:a="http://schemas.openxmlformats.org/drawingml/2006/main" xmlns:r="http://schemas.openxmlformats.org/officeDocument/2006/relationships" xmlns:p="http://schemas.openxmlformats.org/presentationml/2006/main">
+  <p:cSld>
+    <p:spTree>
+      <p:nvGrpSpPr>
+        <p:cNvPr id="1" name=""/>
+        <p:cNvGrpSpPr/>
+        <p:nvPr/>
+      </p:nvGrpSpPr>
+      <p:grpSpPr>
+        <a:xfrm>
+          <a:off x="0" y="0"/>
+          <a:ext cx="0" cy="0"/>
+          <a:chOff x="0" y="0"/>
+          <a:chExt cx="0" cy="0"/>
+        </a:xfrm>
+      </p:grpSpPr>
+      <p:sp>
+        <p:nvSpPr>
           <p:cNvPr id="28673" name="Title 1"/>
           <p:cNvSpPr>
             <a:spLocks noGrp="1"/>
@@ -11967,7 +12923,7 @@
 </p:sld>
 </file>
 
-<file path=ppt/slides/slide4.xml><?xml version="1.0" encoding="utf-8"?>
+<file path=ppt/slides/slide5.xml><?xml version="1.0" encoding="utf-8"?>
 <p:sld xmlns:a="http://schemas.openxmlformats.org/drawingml/2006/main" xmlns:r="http://schemas.openxmlformats.org/officeDocument/2006/relationships" xmlns:p="http://schemas.openxmlformats.org/presentationml/2006/main">
   <p:cSld>
     <p:spTree>
@@ -12389,7 +13345,7 @@
 </p:sld>
 </file>
 
-<file path=ppt/slides/slide5.xml><?xml version="1.0" encoding="utf-8"?>
+<file path=ppt/slides/slide6.xml><?xml version="1.0" encoding="utf-8"?>
 <p:sld xmlns:a="http://schemas.openxmlformats.org/drawingml/2006/main" xmlns:r="http://schemas.openxmlformats.org/officeDocument/2006/relationships" xmlns:p="http://schemas.openxmlformats.org/presentationml/2006/main">
   <p:cSld>
     <p:spTree>
@@ -12861,7 +13817,7 @@
 </p:sld>
 </file>
 
-<file path=ppt/slides/slide6.xml><?xml version="1.0" encoding="utf-8"?>
+<file path=ppt/slides/slide7.xml><?xml version="1.0" encoding="utf-8"?>
 <p:sld xmlns:a="http://schemas.openxmlformats.org/drawingml/2006/main" xmlns:r="http://schemas.openxmlformats.org/officeDocument/2006/relationships" xmlns:p="http://schemas.openxmlformats.org/presentationml/2006/main">
   <p:cSld>
     <p:spTree>
@@ -13397,7 +14353,7 @@
 </p:sld>
 </file>
 
-<file path=ppt/slides/slide7.xml><?xml version="1.0" encoding="utf-8"?>
+<file path=ppt/slides/slide8.xml><?xml version="1.0" encoding="utf-8"?>
 <p:sld xmlns:a="http://schemas.openxmlformats.org/drawingml/2006/main" xmlns:r="http://schemas.openxmlformats.org/officeDocument/2006/relationships" xmlns:p="http://schemas.openxmlformats.org/presentationml/2006/main">
   <p:cSld>
     <p:spTree>
@@ -13456,8 +14412,8 @@
         </p:nvSpPr>
         <p:spPr>
           <a:xfrm>
-            <a:off x="122548" y="1116733"/>
-            <a:ext cx="3558082" cy="5262979"/>
+            <a:off x="122548" y="831727"/>
+            <a:ext cx="3558082" cy="4524315"/>
           </a:xfrm>
           <a:prstGeom prst="rect">
             <a:avLst/>
@@ -13470,41 +14426,14 @@
           </a:bodyPr>
           <a:lstStyle/>
           <a:p>
-            <a:r>
-              <a:rPr lang="en-US" sz="1600" dirty="0"/>
-              <a:t>Map reads to the genome</a:t>
-            </a:r>
-            <a:br>
-              <a:rPr lang="en-US" sz="1600" dirty="0"/>
-            </a:br>
-            <a:endParaRPr lang="en-US" sz="1600" dirty="0"/>
-          </a:p>
-          <a:p>
-            <a:br>
-              <a:rPr lang="en-US" sz="1600" dirty="0"/>
-            </a:br>
-            <a:r>
-              <a:rPr lang="en-US" sz="1600" dirty="0"/>
-              <a:t>Infer isoforms:</a:t>
-            </a:r>
-            <a:br>
-              <a:rPr lang="en-US" sz="1600" dirty="0"/>
-            </a:br>
-            <a:endParaRPr lang="en-US" sz="1600" dirty="0"/>
-          </a:p>
-          <a:p>
             <a:pPr marL="285750" indent="-285750">
               <a:buFontTx/>
               <a:buChar char="-"/>
             </a:pPr>
             <a:r>
               <a:rPr lang="en-US" sz="1600" dirty="0"/>
-              <a:t>iteratively extract the heaviest path from a splice graph</a:t>
-            </a:r>
-            <a:br>
-              <a:rPr lang="en-US" sz="1600" dirty="0"/>
-            </a:br>
-            <a:endParaRPr lang="en-US" sz="1600" dirty="0"/>
+              <a:t>Align reads to the genome, optionally assemble super-reads and re-align</a:t>
+            </a:r>
           </a:p>
           <a:p>
             <a:pPr marL="285750" indent="-285750">
@@ -13513,12 +14442,20 @@
             </a:pPr>
             <a:r>
               <a:rPr lang="en-US" sz="1600" dirty="0"/>
-              <a:t>construct a flow network</a:t>
-            </a:r>
+              <a:t>Group reads into clusters</a:t>
+            </a:r>
+          </a:p>
+          <a:p>
+            <a:endParaRPr lang="en-US" sz="1600" dirty="0"/>
+          </a:p>
+          <a:p>
             <a:br>
               <a:rPr lang="en-US" sz="1600" dirty="0"/>
             </a:br>
-            <a:endParaRPr lang="en-US" sz="1600" dirty="0"/>
+            <a:r>
+              <a:rPr lang="en-US" sz="1600" dirty="0"/>
+              <a:t>Infer isoforms:</a:t>
+            </a:r>
           </a:p>
           <a:p>
             <a:pPr marL="285750" indent="-285750">
@@ -13527,12 +14464,8 @@
             </a:pPr>
             <a:r>
               <a:rPr lang="en-US" sz="1600" dirty="0"/>
-              <a:t>compute maximum flow to estimate abundance</a:t>
-            </a:r>
-            <a:br>
-              <a:rPr lang="en-US" sz="1600" dirty="0"/>
-            </a:br>
-            <a:endParaRPr lang="en-US" sz="1600" dirty="0"/>
+              <a:t>Build alternative splice graph (ASG)</a:t>
+            </a:r>
           </a:p>
           <a:p>
             <a:pPr marL="285750" indent="-285750">
@@ -13541,12 +14474,38 @@
             </a:pPr>
             <a:r>
               <a:rPr lang="en-US" sz="1600" dirty="0"/>
+              <a:t>Iteratively extract the heaviest path from a splice graph</a:t>
+            </a:r>
+          </a:p>
+          <a:p>
+            <a:pPr marL="285750" indent="-285750">
+              <a:buFontTx/>
+              <a:buChar char="-"/>
+            </a:pPr>
+            <a:r>
+              <a:rPr lang="en-US" sz="1600" dirty="0"/>
+              <a:t>construct a flow network</a:t>
+            </a:r>
+          </a:p>
+          <a:p>
+            <a:pPr marL="285750" indent="-285750">
+              <a:buFontTx/>
+              <a:buChar char="-"/>
+            </a:pPr>
+            <a:r>
+              <a:rPr lang="en-US" sz="1600" dirty="0"/>
+              <a:t>compute maximum flow to estimate abundance</a:t>
+            </a:r>
+          </a:p>
+          <a:p>
+            <a:pPr marL="285750" indent="-285750">
+              <a:buFontTx/>
+              <a:buChar char="-"/>
+            </a:pPr>
+            <a:r>
+              <a:rPr lang="en-US" sz="1600" dirty="0"/>
               <a:t>update the splice graph by removing reads that were assigned by the flow algorithm</a:t>
             </a:r>
-            <a:br>
-              <a:rPr lang="en-US" sz="1600" dirty="0"/>
-            </a:br>
-            <a:endParaRPr lang="en-US" sz="1600" dirty="0"/>
           </a:p>
           <a:p>
             <a:pPr marL="285750" indent="-285750">
@@ -13651,7 +14610,7 @@
 </p:sld>
 </file>
 
-<file path=ppt/slides/slide8.xml><?xml version="1.0" encoding="utf-8"?>
+<file path=ppt/slides/slide9.xml><?xml version="1.0" encoding="utf-8"?>
 <p:sld xmlns:a="http://schemas.openxmlformats.org/drawingml/2006/main" xmlns:r="http://schemas.openxmlformats.org/officeDocument/2006/relationships" xmlns:p="http://schemas.openxmlformats.org/presentationml/2006/main">
   <p:cSld>
     <p:spTree>
@@ -13725,7 +14684,7 @@
         <p:spPr>
           <a:xfrm>
             <a:off x="2639616" y="980728"/>
-            <a:ext cx="6480720" cy="4926544"/>
+            <a:ext cx="6302678" cy="4791199"/>
           </a:xfrm>
         </p:spPr>
       </p:pic>
@@ -13737,8 +14696,8 @@
         </p:nvSpPr>
         <p:spPr>
           <a:xfrm>
-            <a:off x="491067" y="5877272"/>
-            <a:ext cx="11311466" cy="523220"/>
+            <a:off x="491067" y="5729355"/>
+            <a:ext cx="11311466" cy="646331"/>
           </a:xfrm>
           <a:prstGeom prst="rect">
             <a:avLst/>
@@ -13750,16 +14709,10 @@
           </a:bodyPr>
           <a:lstStyle/>
           <a:p>
-            <a:r>
-              <a:rPr lang="en-US" sz="1400" dirty="0"/>
-              <a:t>StringTie uses basic graph theory (splice graph), custom heuristics (heaviest path), more graph theory </a:t>
-            </a:r>
-            <a:br>
-              <a:rPr lang="en-US" sz="1400" dirty="0"/>
-            </a:br>
-            <a:r>
-              <a:rPr lang="en-US" sz="1400" dirty="0"/>
-              <a:t>(flow network) and optimization theory (maximum flow). See StringTie paper for definitions and math.</a:t>
+            <a:pPr algn="ctr"/>
+            <a:r>
+              <a:rPr lang="en-US" dirty="0"/>
+              <a:t>StringTie uses basic graph theory (splice graph), custom heuristics (heaviest path), more graph theory  (flow network) and optimization theory (maximum flow). See StringTie paper for definitions and math.</a:t>
             </a:r>
           </a:p>
         </p:txBody>
@@ -13852,144 +14805,6 @@
       <p:bldP spid="5" grpId="0"/>
     </p:bldLst>
   </p:timing>
-</p:sld>
-</file>
-
-<file path=ppt/slides/slide9.xml><?xml version="1.0" encoding="utf-8"?>
-<p:sld xmlns:a="http://schemas.openxmlformats.org/drawingml/2006/main" xmlns:r="http://schemas.openxmlformats.org/officeDocument/2006/relationships" xmlns:p="http://schemas.openxmlformats.org/presentationml/2006/main">
-  <p:cSld>
-    <p:spTree>
-      <p:nvGrpSpPr>
-        <p:cNvPr id="1" name=""/>
-        <p:cNvGrpSpPr/>
-        <p:nvPr/>
-      </p:nvGrpSpPr>
-      <p:grpSpPr>
-        <a:xfrm>
-          <a:off x="0" y="0"/>
-          <a:ext cx="0" cy="0"/>
-          <a:chOff x="0" y="0"/>
-          <a:chExt cx="0" cy="0"/>
-        </a:xfrm>
-      </p:grpSpPr>
-      <p:sp>
-        <p:nvSpPr>
-          <p:cNvPr id="2" name="Title 1"/>
-          <p:cNvSpPr>
-            <a:spLocks noGrp="1"/>
-          </p:cNvSpPr>
-          <p:nvPr>
-            <p:ph type="title"/>
-          </p:nvPr>
-        </p:nvSpPr>
-        <p:spPr/>
-        <p:txBody>
-          <a:bodyPr/>
-          <a:lstStyle/>
-          <a:p>
-            <a:pPr algn="ctr"/>
-            <a:r>
-              <a:rPr lang="en-US" b="1" dirty="0">
-                <a:latin typeface="Calibri" panose="020F0502020204030204" pitchFamily="34" charset="0"/>
-                <a:cs typeface="Calibri" panose="020F0502020204030204" pitchFamily="34" charset="0"/>
-              </a:rPr>
-              <a:t>StringTie -merge</a:t>
-            </a:r>
-          </a:p>
-        </p:txBody>
-      </p:sp>
-      <p:sp>
-        <p:nvSpPr>
-          <p:cNvPr id="3" name="Content Placeholder 2"/>
-          <p:cNvSpPr>
-            <a:spLocks noGrp="1"/>
-          </p:cNvSpPr>
-          <p:nvPr>
-            <p:ph idx="1"/>
-          </p:nvPr>
-        </p:nvSpPr>
-        <p:spPr/>
-        <p:txBody>
-          <a:bodyPr/>
-          <a:lstStyle/>
-          <a:p>
-            <a:r>
-              <a:rPr lang="en-US" dirty="0"/>
-              <a:t>Merge together all gene structures from all samples</a:t>
-            </a:r>
-          </a:p>
-          <a:p>
-            <a:pPr lvl="1"/>
-            <a:r>
-              <a:rPr lang="en-US" dirty="0"/>
-              <a:t>Some samples may only partially represent a gene structure</a:t>
-            </a:r>
-            <a:br>
-              <a:rPr lang="en-US" dirty="0"/>
-            </a:br>
-            <a:endParaRPr lang="en-US" dirty="0"/>
-          </a:p>
-          <a:p>
-            <a:r>
-              <a:rPr lang="en-US" dirty="0"/>
-              <a:t>Incorporates known transcripts with assembled, potentially novel transcripts</a:t>
-            </a:r>
-            <a:br>
-              <a:rPr lang="en-US" dirty="0"/>
-            </a:br>
-            <a:endParaRPr lang="en-US" dirty="0"/>
-          </a:p>
-          <a:p>
-            <a:r>
-              <a:rPr lang="en-US" dirty="0"/>
-              <a:t>For de novo or reference guided mode, we will rerun StringTie with the merged transcript assembly.</a:t>
-            </a:r>
-          </a:p>
-        </p:txBody>
-      </p:sp>
-      <p:sp>
-        <p:nvSpPr>
-          <p:cNvPr id="4" name="TextBox 3"/>
-          <p:cNvSpPr txBox="1"/>
-          <p:nvPr/>
-        </p:nvSpPr>
-        <p:spPr>
-          <a:xfrm>
-            <a:off x="6240016" y="6021288"/>
-            <a:ext cx="4427984" cy="369332"/>
-          </a:xfrm>
-          <a:prstGeom prst="rect">
-            <a:avLst/>
-          </a:prstGeom>
-          <a:noFill/>
-        </p:spPr>
-        <p:txBody>
-          <a:bodyPr wrap="square" rtlCol="0">
-            <a:spAutoFit/>
-          </a:bodyPr>
-          <a:lstStyle/>
-          <a:p>
-            <a:r>
-              <a:rPr lang="en-US" dirty="0" err="1"/>
-              <a:t>Pertea</a:t>
-            </a:r>
-            <a:r>
-              <a:rPr lang="en-US" dirty="0"/>
-              <a:t> et al. Nature Protocols, 2016</a:t>
-            </a:r>
-          </a:p>
-        </p:txBody>
-      </p:sp>
-    </p:spTree>
-    <p:extLst>
-      <p:ext uri="{BB962C8B-B14F-4D97-AF65-F5344CB8AC3E}">
-        <p14:creationId xmlns:p14="http://schemas.microsoft.com/office/powerpoint/2010/main" val="3490153317"/>
-      </p:ext>
-    </p:extLst>
-  </p:cSld>
-  <p:clrMapOvr>
-    <a:masterClrMapping/>
-  </p:clrMapOvr>
 </p:sld>
 </file>
 

</xml_diff>